<commit_message>
rebasing explained and some minor changes
</commit_message>
<xml_diff>
--- a/graph_diagrams.pptx
+++ b/graph_diagrams.pptx
@@ -105,7 +105,16 @@
       </a:defRPr>
     </a:lvl9pPr>
   </p:defaultTextStyle>
+  <p:extLst>
+    <p:ext uri="{EFAFB233-063F-42B5-8137-9DF3F51BA10A}">
+      <p15:sldGuideLst xmlns:p15="http://schemas.microsoft.com/office/powerpoint/2012/main"/>
+    </p:ext>
+  </p:extLst>
 </p:presentation>
+</file>
+
+<file path=ppt/revisionInfo.xml><?xml version="1.0" encoding="utf-8"?>
+<p1510:revInfo xmlns:a="http://schemas.openxmlformats.org/drawingml/2006/main" xmlns:r="http://schemas.openxmlformats.org/officeDocument/2006/relationships" xmlns:p1510="http://schemas.microsoft.com/office/powerpoint/2015/10/main"/>
 </file>
 
 <file path=ppt/slideLayouts/slideLayout1.xml><?xml version="1.0" encoding="utf-8"?>
@@ -150,7 +159,7 @@
           </a:lstStyle>
           <a:p>
             <a:r>
-              <a:rPr lang="en-US" smtClean="0"/>
+              <a:rPr lang="en-US"/>
               <a:t>Click to edit Master title style</a:t>
             </a:r>
             <a:endParaRPr lang="en-GB"/>
@@ -215,7 +224,7 @@
           </a:lstStyle>
           <a:p>
             <a:r>
-              <a:rPr lang="en-US" smtClean="0"/>
+              <a:rPr lang="en-US"/>
               <a:t>Click to edit Master subtitle style</a:t>
             </a:r>
             <a:endParaRPr lang="en-GB"/>
@@ -239,7 +248,7 @@
           <a:p>
             <a:fld id="{26DDC37A-2C2D-40D8-9678-FEE24CA3A861}" type="datetimeFigureOut">
               <a:rPr lang="en-GB" smtClean="0"/>
-              <a:t>14/08/2017</a:t>
+              <a:t>19/08/2017</a:t>
             </a:fld>
             <a:endParaRPr lang="en-GB"/>
           </a:p>
@@ -281,7 +290,7 @@
           <a:p>
             <a:fld id="{53007432-4F62-4A3D-96D0-1D087F291AF4}" type="slidenum">
               <a:rPr lang="en-GB" smtClean="0"/>
-              <a:t>‹#›</a:t>
+              <a:t>‹Nr.›</a:t>
             </a:fld>
             <a:endParaRPr lang="en-GB"/>
           </a:p>
@@ -333,7 +342,7 @@
           <a:lstStyle/>
           <a:p>
             <a:r>
-              <a:rPr lang="en-US" smtClean="0"/>
+              <a:rPr lang="en-US"/>
               <a:t>Click to edit Master title style</a:t>
             </a:r>
             <a:endParaRPr lang="en-GB"/>
@@ -357,35 +366,35 @@
           <a:p>
             <a:pPr lvl="0"/>
             <a:r>
-              <a:rPr lang="en-US" smtClean="0"/>
+              <a:rPr lang="en-US"/>
               <a:t>Edit Master text styles</a:t>
             </a:r>
           </a:p>
           <a:p>
             <a:pPr lvl="1"/>
             <a:r>
-              <a:rPr lang="en-US" smtClean="0"/>
+              <a:rPr lang="en-US"/>
               <a:t>Second level</a:t>
             </a:r>
           </a:p>
           <a:p>
             <a:pPr lvl="2"/>
             <a:r>
-              <a:rPr lang="en-US" smtClean="0"/>
+              <a:rPr lang="en-US"/>
               <a:t>Third level</a:t>
             </a:r>
           </a:p>
           <a:p>
             <a:pPr lvl="3"/>
             <a:r>
-              <a:rPr lang="en-US" smtClean="0"/>
+              <a:rPr lang="en-US"/>
               <a:t>Fourth level</a:t>
             </a:r>
           </a:p>
           <a:p>
             <a:pPr lvl="4"/>
             <a:r>
-              <a:rPr lang="en-US" smtClean="0"/>
+              <a:rPr lang="en-US"/>
               <a:t>Fifth level</a:t>
             </a:r>
             <a:endParaRPr lang="en-GB"/>
@@ -409,7 +418,7 @@
           <a:p>
             <a:fld id="{26DDC37A-2C2D-40D8-9678-FEE24CA3A861}" type="datetimeFigureOut">
               <a:rPr lang="en-GB" smtClean="0"/>
-              <a:t>14/08/2017</a:t>
+              <a:t>19/08/2017</a:t>
             </a:fld>
             <a:endParaRPr lang="en-GB"/>
           </a:p>
@@ -451,7 +460,7 @@
           <a:p>
             <a:fld id="{53007432-4F62-4A3D-96D0-1D087F291AF4}" type="slidenum">
               <a:rPr lang="en-GB" smtClean="0"/>
-              <a:t>‹#›</a:t>
+              <a:t>‹Nr.›</a:t>
             </a:fld>
             <a:endParaRPr lang="en-GB"/>
           </a:p>
@@ -508,7 +517,7 @@
           <a:lstStyle/>
           <a:p>
             <a:r>
-              <a:rPr lang="en-US" smtClean="0"/>
+              <a:rPr lang="en-US"/>
               <a:t>Click to edit Master title style</a:t>
             </a:r>
             <a:endParaRPr lang="en-GB"/>
@@ -537,35 +546,35 @@
           <a:p>
             <a:pPr lvl="0"/>
             <a:r>
-              <a:rPr lang="en-US" smtClean="0"/>
+              <a:rPr lang="en-US"/>
               <a:t>Edit Master text styles</a:t>
             </a:r>
           </a:p>
           <a:p>
             <a:pPr lvl="1"/>
             <a:r>
-              <a:rPr lang="en-US" smtClean="0"/>
+              <a:rPr lang="en-US"/>
               <a:t>Second level</a:t>
             </a:r>
           </a:p>
           <a:p>
             <a:pPr lvl="2"/>
             <a:r>
-              <a:rPr lang="en-US" smtClean="0"/>
+              <a:rPr lang="en-US"/>
               <a:t>Third level</a:t>
             </a:r>
           </a:p>
           <a:p>
             <a:pPr lvl="3"/>
             <a:r>
-              <a:rPr lang="en-US" smtClean="0"/>
+              <a:rPr lang="en-US"/>
               <a:t>Fourth level</a:t>
             </a:r>
           </a:p>
           <a:p>
             <a:pPr lvl="4"/>
             <a:r>
-              <a:rPr lang="en-US" smtClean="0"/>
+              <a:rPr lang="en-US"/>
               <a:t>Fifth level</a:t>
             </a:r>
             <a:endParaRPr lang="en-GB"/>
@@ -589,7 +598,7 @@
           <a:p>
             <a:fld id="{26DDC37A-2C2D-40D8-9678-FEE24CA3A861}" type="datetimeFigureOut">
               <a:rPr lang="en-GB" smtClean="0"/>
-              <a:t>14/08/2017</a:t>
+              <a:t>19/08/2017</a:t>
             </a:fld>
             <a:endParaRPr lang="en-GB"/>
           </a:p>
@@ -631,7 +640,7 @@
           <a:p>
             <a:fld id="{53007432-4F62-4A3D-96D0-1D087F291AF4}" type="slidenum">
               <a:rPr lang="en-GB" smtClean="0"/>
-              <a:t>‹#›</a:t>
+              <a:t>‹Nr.›</a:t>
             </a:fld>
             <a:endParaRPr lang="en-GB"/>
           </a:p>
@@ -683,7 +692,7 @@
           <a:lstStyle/>
           <a:p>
             <a:r>
-              <a:rPr lang="en-US" smtClean="0"/>
+              <a:rPr lang="en-US"/>
               <a:t>Click to edit Master title style</a:t>
             </a:r>
             <a:endParaRPr lang="en-GB"/>
@@ -707,35 +716,35 @@
           <a:p>
             <a:pPr lvl="0"/>
             <a:r>
-              <a:rPr lang="en-US" smtClean="0"/>
+              <a:rPr lang="en-US"/>
               <a:t>Edit Master text styles</a:t>
             </a:r>
           </a:p>
           <a:p>
             <a:pPr lvl="1"/>
             <a:r>
-              <a:rPr lang="en-US" smtClean="0"/>
+              <a:rPr lang="en-US"/>
               <a:t>Second level</a:t>
             </a:r>
           </a:p>
           <a:p>
             <a:pPr lvl="2"/>
             <a:r>
-              <a:rPr lang="en-US" smtClean="0"/>
+              <a:rPr lang="en-US"/>
               <a:t>Third level</a:t>
             </a:r>
           </a:p>
           <a:p>
             <a:pPr lvl="3"/>
             <a:r>
-              <a:rPr lang="en-US" smtClean="0"/>
+              <a:rPr lang="en-US"/>
               <a:t>Fourth level</a:t>
             </a:r>
           </a:p>
           <a:p>
             <a:pPr lvl="4"/>
             <a:r>
-              <a:rPr lang="en-US" smtClean="0"/>
+              <a:rPr lang="en-US"/>
               <a:t>Fifth level</a:t>
             </a:r>
             <a:endParaRPr lang="en-GB"/>
@@ -759,7 +768,7 @@
           <a:p>
             <a:fld id="{26DDC37A-2C2D-40D8-9678-FEE24CA3A861}" type="datetimeFigureOut">
               <a:rPr lang="en-GB" smtClean="0"/>
-              <a:t>14/08/2017</a:t>
+              <a:t>19/08/2017</a:t>
             </a:fld>
             <a:endParaRPr lang="en-GB"/>
           </a:p>
@@ -801,7 +810,7 @@
           <a:p>
             <a:fld id="{53007432-4F62-4A3D-96D0-1D087F291AF4}" type="slidenum">
               <a:rPr lang="en-GB" smtClean="0"/>
-              <a:t>‹#›</a:t>
+              <a:t>‹Nr.›</a:t>
             </a:fld>
             <a:endParaRPr lang="en-GB"/>
           </a:p>
@@ -862,7 +871,7 @@
           </a:lstStyle>
           <a:p>
             <a:r>
-              <a:rPr lang="en-US" smtClean="0"/>
+              <a:rPr lang="en-US"/>
               <a:t>Click to edit Master title style</a:t>
             </a:r>
             <a:endParaRPr lang="en-GB"/>
@@ -982,7 +991,7 @@
           <a:p>
             <a:pPr lvl="0"/>
             <a:r>
-              <a:rPr lang="en-US" smtClean="0"/>
+              <a:rPr lang="en-US"/>
               <a:t>Edit Master text styles</a:t>
             </a:r>
           </a:p>
@@ -1005,7 +1014,7 @@
           <a:p>
             <a:fld id="{26DDC37A-2C2D-40D8-9678-FEE24CA3A861}" type="datetimeFigureOut">
               <a:rPr lang="en-GB" smtClean="0"/>
-              <a:t>14/08/2017</a:t>
+              <a:t>19/08/2017</a:t>
             </a:fld>
             <a:endParaRPr lang="en-GB"/>
           </a:p>
@@ -1047,7 +1056,7 @@
           <a:p>
             <a:fld id="{53007432-4F62-4A3D-96D0-1D087F291AF4}" type="slidenum">
               <a:rPr lang="en-GB" smtClean="0"/>
-              <a:t>‹#›</a:t>
+              <a:t>‹Nr.›</a:t>
             </a:fld>
             <a:endParaRPr lang="en-GB"/>
           </a:p>
@@ -1099,7 +1108,7 @@
           <a:lstStyle/>
           <a:p>
             <a:r>
-              <a:rPr lang="en-US" smtClean="0"/>
+              <a:rPr lang="en-US"/>
               <a:t>Click to edit Master title style</a:t>
             </a:r>
             <a:endParaRPr lang="en-GB"/>
@@ -1128,35 +1137,35 @@
           <a:p>
             <a:pPr lvl="0"/>
             <a:r>
-              <a:rPr lang="en-US" smtClean="0"/>
+              <a:rPr lang="en-US"/>
               <a:t>Edit Master text styles</a:t>
             </a:r>
           </a:p>
           <a:p>
             <a:pPr lvl="1"/>
             <a:r>
-              <a:rPr lang="en-US" smtClean="0"/>
+              <a:rPr lang="en-US"/>
               <a:t>Second level</a:t>
             </a:r>
           </a:p>
           <a:p>
             <a:pPr lvl="2"/>
             <a:r>
-              <a:rPr lang="en-US" smtClean="0"/>
+              <a:rPr lang="en-US"/>
               <a:t>Third level</a:t>
             </a:r>
           </a:p>
           <a:p>
             <a:pPr lvl="3"/>
             <a:r>
-              <a:rPr lang="en-US" smtClean="0"/>
+              <a:rPr lang="en-US"/>
               <a:t>Fourth level</a:t>
             </a:r>
           </a:p>
           <a:p>
             <a:pPr lvl="4"/>
             <a:r>
-              <a:rPr lang="en-US" smtClean="0"/>
+              <a:rPr lang="en-US"/>
               <a:t>Fifth level</a:t>
             </a:r>
             <a:endParaRPr lang="en-GB"/>
@@ -1185,35 +1194,35 @@
           <a:p>
             <a:pPr lvl="0"/>
             <a:r>
-              <a:rPr lang="en-US" smtClean="0"/>
+              <a:rPr lang="en-US"/>
               <a:t>Edit Master text styles</a:t>
             </a:r>
           </a:p>
           <a:p>
             <a:pPr lvl="1"/>
             <a:r>
-              <a:rPr lang="en-US" smtClean="0"/>
+              <a:rPr lang="en-US"/>
               <a:t>Second level</a:t>
             </a:r>
           </a:p>
           <a:p>
             <a:pPr lvl="2"/>
             <a:r>
-              <a:rPr lang="en-US" smtClean="0"/>
+              <a:rPr lang="en-US"/>
               <a:t>Third level</a:t>
             </a:r>
           </a:p>
           <a:p>
             <a:pPr lvl="3"/>
             <a:r>
-              <a:rPr lang="en-US" smtClean="0"/>
+              <a:rPr lang="en-US"/>
               <a:t>Fourth level</a:t>
             </a:r>
           </a:p>
           <a:p>
             <a:pPr lvl="4"/>
             <a:r>
-              <a:rPr lang="en-US" smtClean="0"/>
+              <a:rPr lang="en-US"/>
               <a:t>Fifth level</a:t>
             </a:r>
             <a:endParaRPr lang="en-GB"/>
@@ -1237,7 +1246,7 @@
           <a:p>
             <a:fld id="{26DDC37A-2C2D-40D8-9678-FEE24CA3A861}" type="datetimeFigureOut">
               <a:rPr lang="en-GB" smtClean="0"/>
-              <a:t>14/08/2017</a:t>
+              <a:t>19/08/2017</a:t>
             </a:fld>
             <a:endParaRPr lang="en-GB"/>
           </a:p>
@@ -1279,7 +1288,7 @@
           <a:p>
             <a:fld id="{53007432-4F62-4A3D-96D0-1D087F291AF4}" type="slidenum">
               <a:rPr lang="en-GB" smtClean="0"/>
-              <a:t>‹#›</a:t>
+              <a:t>‹Nr.›</a:t>
             </a:fld>
             <a:endParaRPr lang="en-GB"/>
           </a:p>
@@ -1336,7 +1345,7 @@
           <a:lstStyle/>
           <a:p>
             <a:r>
-              <a:rPr lang="en-US" smtClean="0"/>
+              <a:rPr lang="en-US"/>
               <a:t>Click to edit Master title style</a:t>
             </a:r>
             <a:endParaRPr lang="en-GB"/>
@@ -1402,7 +1411,7 @@
           <a:p>
             <a:pPr lvl="0"/>
             <a:r>
-              <a:rPr lang="en-US" smtClean="0"/>
+              <a:rPr lang="en-US"/>
               <a:t>Edit Master text styles</a:t>
             </a:r>
           </a:p>
@@ -1430,35 +1439,35 @@
           <a:p>
             <a:pPr lvl="0"/>
             <a:r>
-              <a:rPr lang="en-US" smtClean="0"/>
+              <a:rPr lang="en-US"/>
               <a:t>Edit Master text styles</a:t>
             </a:r>
           </a:p>
           <a:p>
             <a:pPr lvl="1"/>
             <a:r>
-              <a:rPr lang="en-US" smtClean="0"/>
+              <a:rPr lang="en-US"/>
               <a:t>Second level</a:t>
             </a:r>
           </a:p>
           <a:p>
             <a:pPr lvl="2"/>
             <a:r>
-              <a:rPr lang="en-US" smtClean="0"/>
+              <a:rPr lang="en-US"/>
               <a:t>Third level</a:t>
             </a:r>
           </a:p>
           <a:p>
             <a:pPr lvl="3"/>
             <a:r>
-              <a:rPr lang="en-US" smtClean="0"/>
+              <a:rPr lang="en-US"/>
               <a:t>Fourth level</a:t>
             </a:r>
           </a:p>
           <a:p>
             <a:pPr lvl="4"/>
             <a:r>
-              <a:rPr lang="en-US" smtClean="0"/>
+              <a:rPr lang="en-US"/>
               <a:t>Fifth level</a:t>
             </a:r>
             <a:endParaRPr lang="en-GB"/>
@@ -1524,7 +1533,7 @@
           <a:p>
             <a:pPr lvl="0"/>
             <a:r>
-              <a:rPr lang="en-US" smtClean="0"/>
+              <a:rPr lang="en-US"/>
               <a:t>Edit Master text styles</a:t>
             </a:r>
           </a:p>
@@ -1552,35 +1561,35 @@
           <a:p>
             <a:pPr lvl="0"/>
             <a:r>
-              <a:rPr lang="en-US" smtClean="0"/>
+              <a:rPr lang="en-US"/>
               <a:t>Edit Master text styles</a:t>
             </a:r>
           </a:p>
           <a:p>
             <a:pPr lvl="1"/>
             <a:r>
-              <a:rPr lang="en-US" smtClean="0"/>
+              <a:rPr lang="en-US"/>
               <a:t>Second level</a:t>
             </a:r>
           </a:p>
           <a:p>
             <a:pPr lvl="2"/>
             <a:r>
-              <a:rPr lang="en-US" smtClean="0"/>
+              <a:rPr lang="en-US"/>
               <a:t>Third level</a:t>
             </a:r>
           </a:p>
           <a:p>
             <a:pPr lvl="3"/>
             <a:r>
-              <a:rPr lang="en-US" smtClean="0"/>
+              <a:rPr lang="en-US"/>
               <a:t>Fourth level</a:t>
             </a:r>
           </a:p>
           <a:p>
             <a:pPr lvl="4"/>
             <a:r>
-              <a:rPr lang="en-US" smtClean="0"/>
+              <a:rPr lang="en-US"/>
               <a:t>Fifth level</a:t>
             </a:r>
             <a:endParaRPr lang="en-GB"/>
@@ -1604,7 +1613,7 @@
           <a:p>
             <a:fld id="{26DDC37A-2C2D-40D8-9678-FEE24CA3A861}" type="datetimeFigureOut">
               <a:rPr lang="en-GB" smtClean="0"/>
-              <a:t>14/08/2017</a:t>
+              <a:t>19/08/2017</a:t>
             </a:fld>
             <a:endParaRPr lang="en-GB"/>
           </a:p>
@@ -1646,7 +1655,7 @@
           <a:p>
             <a:fld id="{53007432-4F62-4A3D-96D0-1D087F291AF4}" type="slidenum">
               <a:rPr lang="en-GB" smtClean="0"/>
-              <a:t>‹#›</a:t>
+              <a:t>‹Nr.›</a:t>
             </a:fld>
             <a:endParaRPr lang="en-GB"/>
           </a:p>
@@ -1698,7 +1707,7 @@
           <a:lstStyle/>
           <a:p>
             <a:r>
-              <a:rPr lang="en-US" smtClean="0"/>
+              <a:rPr lang="en-US"/>
               <a:t>Click to edit Master title style</a:t>
             </a:r>
             <a:endParaRPr lang="en-GB"/>
@@ -1722,7 +1731,7 @@
           <a:p>
             <a:fld id="{26DDC37A-2C2D-40D8-9678-FEE24CA3A861}" type="datetimeFigureOut">
               <a:rPr lang="en-GB" smtClean="0"/>
-              <a:t>14/08/2017</a:t>
+              <a:t>19/08/2017</a:t>
             </a:fld>
             <a:endParaRPr lang="en-GB"/>
           </a:p>
@@ -1764,7 +1773,7 @@
           <a:p>
             <a:fld id="{53007432-4F62-4A3D-96D0-1D087F291AF4}" type="slidenum">
               <a:rPr lang="en-GB" smtClean="0"/>
-              <a:t>‹#›</a:t>
+              <a:t>‹Nr.›</a:t>
             </a:fld>
             <a:endParaRPr lang="en-GB"/>
           </a:p>
@@ -1817,7 +1826,7 @@
           <a:p>
             <a:fld id="{26DDC37A-2C2D-40D8-9678-FEE24CA3A861}" type="datetimeFigureOut">
               <a:rPr lang="en-GB" smtClean="0"/>
-              <a:t>14/08/2017</a:t>
+              <a:t>19/08/2017</a:t>
             </a:fld>
             <a:endParaRPr lang="en-GB"/>
           </a:p>
@@ -1859,7 +1868,7 @@
           <a:p>
             <a:fld id="{53007432-4F62-4A3D-96D0-1D087F291AF4}" type="slidenum">
               <a:rPr lang="en-GB" smtClean="0"/>
-              <a:t>‹#›</a:t>
+              <a:t>‹Nr.›</a:t>
             </a:fld>
             <a:endParaRPr lang="en-GB"/>
           </a:p>
@@ -1920,7 +1929,7 @@
           </a:lstStyle>
           <a:p>
             <a:r>
-              <a:rPr lang="en-US" smtClean="0"/>
+              <a:rPr lang="en-US"/>
               <a:t>Click to edit Master title style</a:t>
             </a:r>
             <a:endParaRPr lang="en-GB"/>
@@ -1977,35 +1986,35 @@
           <a:p>
             <a:pPr lvl="0"/>
             <a:r>
-              <a:rPr lang="en-US" smtClean="0"/>
+              <a:rPr lang="en-US"/>
               <a:t>Edit Master text styles</a:t>
             </a:r>
           </a:p>
           <a:p>
             <a:pPr lvl="1"/>
             <a:r>
-              <a:rPr lang="en-US" smtClean="0"/>
+              <a:rPr lang="en-US"/>
               <a:t>Second level</a:t>
             </a:r>
           </a:p>
           <a:p>
             <a:pPr lvl="2"/>
             <a:r>
-              <a:rPr lang="en-US" smtClean="0"/>
+              <a:rPr lang="en-US"/>
               <a:t>Third level</a:t>
             </a:r>
           </a:p>
           <a:p>
             <a:pPr lvl="3"/>
             <a:r>
-              <a:rPr lang="en-US" smtClean="0"/>
+              <a:rPr lang="en-US"/>
               <a:t>Fourth level</a:t>
             </a:r>
           </a:p>
           <a:p>
             <a:pPr lvl="4"/>
             <a:r>
-              <a:rPr lang="en-US" smtClean="0"/>
+              <a:rPr lang="en-US"/>
               <a:t>Fifth level</a:t>
             </a:r>
             <a:endParaRPr lang="en-GB"/>
@@ -2071,7 +2080,7 @@
           <a:p>
             <a:pPr lvl="0"/>
             <a:r>
-              <a:rPr lang="en-US" smtClean="0"/>
+              <a:rPr lang="en-US"/>
               <a:t>Edit Master text styles</a:t>
             </a:r>
           </a:p>
@@ -2094,7 +2103,7 @@
           <a:p>
             <a:fld id="{26DDC37A-2C2D-40D8-9678-FEE24CA3A861}" type="datetimeFigureOut">
               <a:rPr lang="en-GB" smtClean="0"/>
-              <a:t>14/08/2017</a:t>
+              <a:t>19/08/2017</a:t>
             </a:fld>
             <a:endParaRPr lang="en-GB"/>
           </a:p>
@@ -2136,7 +2145,7 @@
           <a:p>
             <a:fld id="{53007432-4F62-4A3D-96D0-1D087F291AF4}" type="slidenum">
               <a:rPr lang="en-GB" smtClean="0"/>
-              <a:t>‹#›</a:t>
+              <a:t>‹Nr.›</a:t>
             </a:fld>
             <a:endParaRPr lang="en-GB"/>
           </a:p>
@@ -2197,7 +2206,7 @@
           </a:lstStyle>
           <a:p>
             <a:r>
-              <a:rPr lang="en-US" smtClean="0"/>
+              <a:rPr lang="en-US"/>
               <a:t>Click to edit Master title style</a:t>
             </a:r>
             <a:endParaRPr lang="en-GB"/>
@@ -2324,7 +2333,7 @@
           <a:p>
             <a:pPr lvl="0"/>
             <a:r>
-              <a:rPr lang="en-US" smtClean="0"/>
+              <a:rPr lang="en-US"/>
               <a:t>Edit Master text styles</a:t>
             </a:r>
           </a:p>
@@ -2347,7 +2356,7 @@
           <a:p>
             <a:fld id="{26DDC37A-2C2D-40D8-9678-FEE24CA3A861}" type="datetimeFigureOut">
               <a:rPr lang="en-GB" smtClean="0"/>
-              <a:t>14/08/2017</a:t>
+              <a:t>19/08/2017</a:t>
             </a:fld>
             <a:endParaRPr lang="en-GB"/>
           </a:p>
@@ -2389,7 +2398,7 @@
           <a:p>
             <a:fld id="{53007432-4F62-4A3D-96D0-1D087F291AF4}" type="slidenum">
               <a:rPr lang="en-GB" smtClean="0"/>
-              <a:t>‹#›</a:t>
+              <a:t>‹Nr.›</a:t>
             </a:fld>
             <a:endParaRPr lang="en-GB"/>
           </a:p>
@@ -2456,7 +2465,7 @@
           <a:lstStyle/>
           <a:p>
             <a:r>
-              <a:rPr lang="en-US" smtClean="0"/>
+              <a:rPr lang="en-US"/>
               <a:t>Click to edit Master title style</a:t>
             </a:r>
             <a:endParaRPr lang="en-GB"/>
@@ -2490,35 +2499,35 @@
           <a:p>
             <a:pPr lvl="0"/>
             <a:r>
-              <a:rPr lang="en-US" smtClean="0"/>
+              <a:rPr lang="en-US"/>
               <a:t>Edit Master text styles</a:t>
             </a:r>
           </a:p>
           <a:p>
             <a:pPr lvl="1"/>
             <a:r>
-              <a:rPr lang="en-US" smtClean="0"/>
+              <a:rPr lang="en-US"/>
               <a:t>Second level</a:t>
             </a:r>
           </a:p>
           <a:p>
             <a:pPr lvl="2"/>
             <a:r>
-              <a:rPr lang="en-US" smtClean="0"/>
+              <a:rPr lang="en-US"/>
               <a:t>Third level</a:t>
             </a:r>
           </a:p>
           <a:p>
             <a:pPr lvl="3"/>
             <a:r>
-              <a:rPr lang="en-US" smtClean="0"/>
+              <a:rPr lang="en-US"/>
               <a:t>Fourth level</a:t>
             </a:r>
           </a:p>
           <a:p>
             <a:pPr lvl="4"/>
             <a:r>
-              <a:rPr lang="en-US" smtClean="0"/>
+              <a:rPr lang="en-US"/>
               <a:t>Fifth level</a:t>
             </a:r>
             <a:endParaRPr lang="en-GB"/>
@@ -2560,7 +2569,7 @@
           <a:p>
             <a:fld id="{26DDC37A-2C2D-40D8-9678-FEE24CA3A861}" type="datetimeFigureOut">
               <a:rPr lang="en-GB" smtClean="0"/>
-              <a:t>14/08/2017</a:t>
+              <a:t>19/08/2017</a:t>
             </a:fld>
             <a:endParaRPr lang="en-GB"/>
           </a:p>
@@ -2638,7 +2647,7 @@
           <a:p>
             <a:fld id="{53007432-4F62-4A3D-96D0-1D087F291AF4}" type="slidenum">
               <a:rPr lang="en-GB" smtClean="0"/>
-              <a:t>‹#›</a:t>
+              <a:t>‹Nr.›</a:t>
             </a:fld>
             <a:endParaRPr lang="en-GB"/>
           </a:p>
@@ -3076,10 +3085,9 @@
           <a:p>
             <a:pPr algn="ctr"/>
             <a:r>
-              <a:rPr lang="en-GB" sz="3600" dirty="0" smtClean="0"/>
+              <a:rPr lang="en-GB" sz="3600" dirty="0"/>
               <a:t>A</a:t>
             </a:r>
-            <a:endParaRPr lang="en-GB" sz="3600" dirty="0"/>
           </a:p>
         </p:txBody>
       </p:sp>
@@ -3126,10 +3134,9 @@
           <a:p>
             <a:pPr algn="ctr"/>
             <a:r>
-              <a:rPr lang="en-GB" sz="3600" dirty="0" smtClean="0"/>
+              <a:rPr lang="en-GB" sz="3600" dirty="0"/>
               <a:t>A</a:t>
             </a:r>
-            <a:endParaRPr lang="en-GB" sz="3600" dirty="0"/>
           </a:p>
         </p:txBody>
       </p:sp>
@@ -3176,10 +3183,9 @@
           <a:p>
             <a:pPr algn="ctr"/>
             <a:r>
-              <a:rPr lang="en-GB" sz="3600" dirty="0" smtClean="0"/>
+              <a:rPr lang="en-GB" sz="3600" dirty="0"/>
               <a:t>B</a:t>
             </a:r>
-            <a:endParaRPr lang="en-GB" sz="3600" dirty="0"/>
           </a:p>
         </p:txBody>
       </p:sp>
@@ -3226,10 +3232,9 @@
           <a:p>
             <a:pPr algn="ctr"/>
             <a:r>
-              <a:rPr lang="en-GB" sz="3600" dirty="0" smtClean="0"/>
+              <a:rPr lang="en-GB" sz="3600" dirty="0"/>
               <a:t>C</a:t>
             </a:r>
-            <a:endParaRPr lang="en-GB" sz="3600" dirty="0"/>
           </a:p>
         </p:txBody>
       </p:sp>
@@ -3382,10 +3387,9 @@
           <a:p>
             <a:pPr algn="ctr"/>
             <a:r>
-              <a:rPr lang="en-GB" sz="3600" dirty="0" smtClean="0"/>
+              <a:rPr lang="en-GB" sz="3600" dirty="0"/>
               <a:t>A</a:t>
             </a:r>
-            <a:endParaRPr lang="en-GB" sz="3600" dirty="0"/>
           </a:p>
         </p:txBody>
       </p:sp>
@@ -3432,10 +3436,9 @@
           <a:p>
             <a:pPr algn="ctr"/>
             <a:r>
-              <a:rPr lang="en-GB" sz="3600" dirty="0" smtClean="0"/>
+              <a:rPr lang="en-GB" sz="3600" dirty="0"/>
               <a:t>B</a:t>
             </a:r>
-            <a:endParaRPr lang="en-GB" sz="3600" dirty="0"/>
           </a:p>
         </p:txBody>
       </p:sp>
@@ -3454,7 +3457,9 @@
             <a:avLst/>
           </a:prstGeom>
           <a:solidFill>
-            <a:srgbClr val="FF820A"/>
+            <a:srgbClr val="FF820A">
+              <a:alpha val="30000"/>
+            </a:srgbClr>
           </a:solidFill>
           <a:ln>
             <a:noFill/>
@@ -3482,10 +3487,9 @@
           <a:p>
             <a:pPr algn="ctr"/>
             <a:r>
-              <a:rPr lang="en-GB" sz="3600" dirty="0" smtClean="0"/>
+              <a:rPr lang="en-GB" sz="3600" dirty="0"/>
               <a:t>C</a:t>
             </a:r>
-            <a:endParaRPr lang="en-GB" sz="3600" dirty="0"/>
           </a:p>
         </p:txBody>
       </p:sp>
@@ -3543,6 +3547,11 @@
             <a:avLst/>
           </a:prstGeom>
           <a:ln w="88900">
+            <a:solidFill>
+              <a:schemeClr val="accent1">
+                <a:alpha val="30000"/>
+              </a:schemeClr>
+            </a:solidFill>
             <a:tailEnd type="triangle"/>
           </a:ln>
         </p:spPr>
@@ -3604,10 +3613,9 @@
           <a:p>
             <a:pPr algn="ctr"/>
             <a:r>
-              <a:rPr lang="en-GB" sz="3600" dirty="0" smtClean="0"/>
+              <a:rPr lang="en-GB" sz="3600" dirty="0"/>
               <a:t>C’</a:t>
             </a:r>
-            <a:endParaRPr lang="en-GB" sz="3600" dirty="0"/>
           </a:p>
         </p:txBody>
       </p:sp>
@@ -3695,10 +3703,9 @@
           <a:p>
             <a:pPr algn="ctr"/>
             <a:r>
-              <a:rPr lang="en-GB" sz="2400" dirty="0" smtClean="0"/>
+              <a:rPr lang="en-GB" sz="2400" dirty="0"/>
               <a:t>master</a:t>
             </a:r>
-            <a:endParaRPr lang="en-GB" sz="2400" dirty="0"/>
           </a:p>
         </p:txBody>
       </p:sp>
@@ -3750,10 +3757,9 @@
           <a:p>
             <a:pPr algn="ctr"/>
             <a:r>
-              <a:rPr lang="en-GB" sz="2400" dirty="0" smtClean="0"/>
+              <a:rPr lang="en-GB" sz="2400" dirty="0"/>
               <a:t>master</a:t>
             </a:r>
-            <a:endParaRPr lang="en-GB" sz="2400" dirty="0"/>
           </a:p>
         </p:txBody>
       </p:sp>
@@ -3805,10 +3811,9 @@
           <a:p>
             <a:pPr algn="ctr"/>
             <a:r>
-              <a:rPr lang="en-GB" sz="2400" dirty="0" smtClean="0"/>
+              <a:rPr lang="en-GB" sz="2400" dirty="0"/>
               <a:t>master</a:t>
             </a:r>
-            <a:endParaRPr lang="en-GB" sz="2400" dirty="0"/>
           </a:p>
         </p:txBody>
       </p:sp>
@@ -3860,10 +3865,9 @@
           <a:p>
             <a:pPr algn="ctr"/>
             <a:r>
-              <a:rPr lang="en-GB" sz="2400" dirty="0" smtClean="0"/>
+              <a:rPr lang="en-GB" sz="2400" dirty="0"/>
               <a:t>master</a:t>
             </a:r>
-            <a:endParaRPr lang="en-GB" sz="2400" dirty="0"/>
           </a:p>
         </p:txBody>
       </p:sp>
@@ -3899,39 +3903,2439 @@
       </p:grpSpPr>
       <p:sp>
         <p:nvSpPr>
-          <p:cNvPr id="2" name="Title 1"/>
-          <p:cNvSpPr>
-            <a:spLocks noGrp="1"/>
-          </p:cNvSpPr>
-          <p:nvPr>
-            <p:ph type="title"/>
-          </p:nvPr>
-        </p:nvSpPr>
-        <p:spPr/>
-        <p:txBody>
-          <a:bodyPr/>
-          <a:lstStyle/>
-          <a:p>
-            <a:endParaRPr lang="en-GB"/>
-          </a:p>
-        </p:txBody>
-      </p:sp>
-      <p:sp>
-        <p:nvSpPr>
-          <p:cNvPr id="3" name="Content Placeholder 2"/>
-          <p:cNvSpPr>
-            <a:spLocks noGrp="1"/>
-          </p:cNvSpPr>
-          <p:nvPr>
-            <p:ph idx="1"/>
-          </p:nvPr>
-        </p:nvSpPr>
-        <p:spPr/>
-        <p:txBody>
-          <a:bodyPr/>
-          <a:lstStyle/>
-          <a:p>
-            <a:endParaRPr lang="en-GB"/>
+          <p:cNvPr id="78" name="Down Arrow Callout 67">
+            <a:extLst>
+              <a:ext uri="{FF2B5EF4-FFF2-40B4-BE49-F238E27FC236}">
+                <a16:creationId xmlns:a16="http://schemas.microsoft.com/office/drawing/2014/main" id="{0856F122-239F-479C-90ED-57E87C773CCB}"/>
+              </a:ext>
+            </a:extLst>
+          </p:cNvPr>
+          <p:cNvSpPr/>
+          <p:nvPr/>
+        </p:nvSpPr>
+        <p:spPr>
+          <a:xfrm>
+            <a:off x="12580882" y="5940632"/>
+            <a:ext cx="1307308" cy="716205"/>
+          </a:xfrm>
+          <a:prstGeom prst="downArrowCallout">
+            <a:avLst>
+              <a:gd name="adj1" fmla="val 18711"/>
+              <a:gd name="adj2" fmla="val 18711"/>
+              <a:gd name="adj3" fmla="val 25000"/>
+              <a:gd name="adj4" fmla="val 64977"/>
+            </a:avLst>
+          </a:prstGeom>
+          <a:solidFill>
+            <a:srgbClr val="FEB080"/>
+          </a:solidFill>
+          <a:ln>
+            <a:noFill/>
+          </a:ln>
+        </p:spPr>
+        <p:style>
+          <a:lnRef idx="2">
+            <a:schemeClr val="accent1">
+              <a:shade val="50000"/>
+            </a:schemeClr>
+          </a:lnRef>
+          <a:fillRef idx="1">
+            <a:schemeClr val="accent1"/>
+          </a:fillRef>
+          <a:effectRef idx="0">
+            <a:schemeClr val="accent1"/>
+          </a:effectRef>
+          <a:fontRef idx="minor">
+            <a:schemeClr val="lt1"/>
+          </a:fontRef>
+        </p:style>
+        <p:txBody>
+          <a:bodyPr rtlCol="0" anchor="ctr"/>
+          <a:lstStyle/>
+          <a:p>
+            <a:pPr algn="ctr"/>
+            <a:r>
+              <a:rPr lang="en-GB" sz="2400" dirty="0"/>
+              <a:t>feature</a:t>
+            </a:r>
+          </a:p>
+        </p:txBody>
+      </p:sp>
+      <p:sp>
+        <p:nvSpPr>
+          <p:cNvPr id="4" name="Oval 47">
+            <a:extLst>
+              <a:ext uri="{FF2B5EF4-FFF2-40B4-BE49-F238E27FC236}">
+                <a16:creationId xmlns:a16="http://schemas.microsoft.com/office/drawing/2014/main" id="{5EA7ADD5-9CAA-4F42-B4B8-7A5AB8B4488A}"/>
+              </a:ext>
+            </a:extLst>
+          </p:cNvPr>
+          <p:cNvSpPr/>
+          <p:nvPr/>
+        </p:nvSpPr>
+        <p:spPr>
+          <a:xfrm>
+            <a:off x="746262" y="1563521"/>
+            <a:ext cx="684695" cy="684695"/>
+          </a:xfrm>
+          <a:prstGeom prst="ellipse">
+            <a:avLst/>
+          </a:prstGeom>
+          <a:solidFill>
+            <a:srgbClr val="FF820A"/>
+          </a:solidFill>
+          <a:ln>
+            <a:noFill/>
+          </a:ln>
+        </p:spPr>
+        <p:style>
+          <a:lnRef idx="2">
+            <a:schemeClr val="accent1">
+              <a:shade val="50000"/>
+            </a:schemeClr>
+          </a:lnRef>
+          <a:fillRef idx="1">
+            <a:schemeClr val="accent1"/>
+          </a:fillRef>
+          <a:effectRef idx="0">
+            <a:schemeClr val="accent1"/>
+          </a:effectRef>
+          <a:fontRef idx="minor">
+            <a:schemeClr val="lt1"/>
+          </a:fontRef>
+        </p:style>
+        <p:txBody>
+          <a:bodyPr wrap="none" lIns="0" tIns="0" rIns="0" bIns="0" rtlCol="0" anchor="ctr"/>
+          <a:lstStyle/>
+          <a:p>
+            <a:pPr algn="ctr"/>
+            <a:r>
+              <a:rPr lang="en-GB" sz="3600" dirty="0"/>
+              <a:t>A</a:t>
+            </a:r>
+          </a:p>
+        </p:txBody>
+      </p:sp>
+      <p:sp>
+        <p:nvSpPr>
+          <p:cNvPr id="5" name="Oval 48">
+            <a:extLst>
+              <a:ext uri="{FF2B5EF4-FFF2-40B4-BE49-F238E27FC236}">
+                <a16:creationId xmlns:a16="http://schemas.microsoft.com/office/drawing/2014/main" id="{54FCC982-6C9F-458A-A743-C3EEE22671F8}"/>
+              </a:ext>
+            </a:extLst>
+          </p:cNvPr>
+          <p:cNvSpPr/>
+          <p:nvPr/>
+        </p:nvSpPr>
+        <p:spPr>
+          <a:xfrm>
+            <a:off x="2205698" y="1563521"/>
+            <a:ext cx="684695" cy="684695"/>
+          </a:xfrm>
+          <a:prstGeom prst="ellipse">
+            <a:avLst/>
+          </a:prstGeom>
+          <a:solidFill>
+            <a:srgbClr val="FF820A"/>
+          </a:solidFill>
+          <a:ln>
+            <a:noFill/>
+          </a:ln>
+        </p:spPr>
+        <p:style>
+          <a:lnRef idx="2">
+            <a:schemeClr val="accent1">
+              <a:shade val="50000"/>
+            </a:schemeClr>
+          </a:lnRef>
+          <a:fillRef idx="1">
+            <a:schemeClr val="accent1"/>
+          </a:fillRef>
+          <a:effectRef idx="0">
+            <a:schemeClr val="accent1"/>
+          </a:effectRef>
+          <a:fontRef idx="minor">
+            <a:schemeClr val="lt1"/>
+          </a:fontRef>
+        </p:style>
+        <p:txBody>
+          <a:bodyPr wrap="none" lIns="0" tIns="0" rIns="0" bIns="0" rtlCol="0" anchor="ctr"/>
+          <a:lstStyle/>
+          <a:p>
+            <a:pPr algn="ctr"/>
+            <a:r>
+              <a:rPr lang="en-GB" sz="3600" dirty="0"/>
+              <a:t>B</a:t>
+            </a:r>
+          </a:p>
+        </p:txBody>
+      </p:sp>
+      <p:sp>
+        <p:nvSpPr>
+          <p:cNvPr id="6" name="Oval 49">
+            <a:extLst>
+              <a:ext uri="{FF2B5EF4-FFF2-40B4-BE49-F238E27FC236}">
+                <a16:creationId xmlns:a16="http://schemas.microsoft.com/office/drawing/2014/main" id="{4D2D22CA-5800-4A7B-9AD1-AD0E67619769}"/>
+              </a:ext>
+            </a:extLst>
+          </p:cNvPr>
+          <p:cNvSpPr/>
+          <p:nvPr/>
+        </p:nvSpPr>
+        <p:spPr>
+          <a:xfrm>
+            <a:off x="3665134" y="1563520"/>
+            <a:ext cx="684695" cy="684695"/>
+          </a:xfrm>
+          <a:prstGeom prst="ellipse">
+            <a:avLst/>
+          </a:prstGeom>
+          <a:solidFill>
+            <a:srgbClr val="FF820A"/>
+          </a:solidFill>
+          <a:ln>
+            <a:noFill/>
+          </a:ln>
+        </p:spPr>
+        <p:style>
+          <a:lnRef idx="2">
+            <a:schemeClr val="accent1">
+              <a:shade val="50000"/>
+            </a:schemeClr>
+          </a:lnRef>
+          <a:fillRef idx="1">
+            <a:schemeClr val="accent1"/>
+          </a:fillRef>
+          <a:effectRef idx="0">
+            <a:schemeClr val="accent1"/>
+          </a:effectRef>
+          <a:fontRef idx="minor">
+            <a:schemeClr val="lt1"/>
+          </a:fontRef>
+        </p:style>
+        <p:txBody>
+          <a:bodyPr wrap="none" lIns="0" tIns="0" rIns="0" bIns="0" rtlCol="0" anchor="ctr"/>
+          <a:lstStyle/>
+          <a:p>
+            <a:pPr algn="ctr"/>
+            <a:r>
+              <a:rPr lang="en-GB" sz="3600" dirty="0"/>
+              <a:t>C</a:t>
+            </a:r>
+          </a:p>
+        </p:txBody>
+      </p:sp>
+      <p:cxnSp>
+        <p:nvCxnSpPr>
+          <p:cNvPr id="7" name="Straight Arrow Connector 50">
+            <a:extLst>
+              <a:ext uri="{FF2B5EF4-FFF2-40B4-BE49-F238E27FC236}">
+                <a16:creationId xmlns:a16="http://schemas.microsoft.com/office/drawing/2014/main" id="{1BEF27FC-8886-4945-A892-0BB9F8CD2BE4}"/>
+              </a:ext>
+            </a:extLst>
+          </p:cNvPr>
+          <p:cNvCxnSpPr>
+            <a:stCxn id="4" idx="6"/>
+            <a:endCxn id="5" idx="2"/>
+          </p:cNvCxnSpPr>
+          <p:nvPr/>
+        </p:nvCxnSpPr>
+        <p:spPr>
+          <a:xfrm>
+            <a:off x="1430957" y="1905869"/>
+            <a:ext cx="774741" cy="0"/>
+          </a:xfrm>
+          <a:prstGeom prst="straightConnector1">
+            <a:avLst/>
+          </a:prstGeom>
+          <a:ln w="88900">
+            <a:tailEnd type="triangle"/>
+          </a:ln>
+        </p:spPr>
+        <p:style>
+          <a:lnRef idx="1">
+            <a:schemeClr val="accent1"/>
+          </a:lnRef>
+          <a:fillRef idx="0">
+            <a:schemeClr val="accent1"/>
+          </a:fillRef>
+          <a:effectRef idx="0">
+            <a:schemeClr val="accent1"/>
+          </a:effectRef>
+          <a:fontRef idx="minor">
+            <a:schemeClr val="tx1"/>
+          </a:fontRef>
+        </p:style>
+      </p:cxnSp>
+      <p:cxnSp>
+        <p:nvCxnSpPr>
+          <p:cNvPr id="8" name="Straight Arrow Connector 51">
+            <a:extLst>
+              <a:ext uri="{FF2B5EF4-FFF2-40B4-BE49-F238E27FC236}">
+                <a16:creationId xmlns:a16="http://schemas.microsoft.com/office/drawing/2014/main" id="{60695D23-D3EF-44B3-856E-673B72826592}"/>
+              </a:ext>
+            </a:extLst>
+          </p:cNvPr>
+          <p:cNvCxnSpPr>
+            <a:stCxn id="5" idx="6"/>
+            <a:endCxn id="6" idx="2"/>
+          </p:cNvCxnSpPr>
+          <p:nvPr/>
+        </p:nvCxnSpPr>
+        <p:spPr>
+          <a:xfrm flipV="1">
+            <a:off x="2890393" y="1905868"/>
+            <a:ext cx="774741" cy="1"/>
+          </a:xfrm>
+          <a:prstGeom prst="straightConnector1">
+            <a:avLst/>
+          </a:prstGeom>
+          <a:ln w="88900">
+            <a:tailEnd type="triangle"/>
+          </a:ln>
+        </p:spPr>
+        <p:style>
+          <a:lnRef idx="1">
+            <a:schemeClr val="accent1"/>
+          </a:lnRef>
+          <a:fillRef idx="0">
+            <a:schemeClr val="accent1"/>
+          </a:fillRef>
+          <a:effectRef idx="0">
+            <a:schemeClr val="accent1"/>
+          </a:effectRef>
+          <a:fontRef idx="minor">
+            <a:schemeClr val="tx1"/>
+          </a:fontRef>
+        </p:style>
+      </p:cxnSp>
+      <p:sp>
+        <p:nvSpPr>
+          <p:cNvPr id="9" name="Oval 52">
+            <a:extLst>
+              <a:ext uri="{FF2B5EF4-FFF2-40B4-BE49-F238E27FC236}">
+                <a16:creationId xmlns:a16="http://schemas.microsoft.com/office/drawing/2014/main" id="{4E6CD6C5-C0F4-452A-A29B-97E1C7BEF480}"/>
+              </a:ext>
+            </a:extLst>
+          </p:cNvPr>
+          <p:cNvSpPr/>
+          <p:nvPr/>
+        </p:nvSpPr>
+        <p:spPr>
+          <a:xfrm>
+            <a:off x="3665134" y="431400"/>
+            <a:ext cx="684695" cy="684695"/>
+          </a:xfrm>
+          <a:prstGeom prst="ellipse">
+            <a:avLst/>
+          </a:prstGeom>
+          <a:solidFill>
+            <a:srgbClr val="FF820A"/>
+          </a:solidFill>
+          <a:ln>
+            <a:noFill/>
+          </a:ln>
+        </p:spPr>
+        <p:style>
+          <a:lnRef idx="2">
+            <a:schemeClr val="accent1">
+              <a:shade val="50000"/>
+            </a:schemeClr>
+          </a:lnRef>
+          <a:fillRef idx="1">
+            <a:schemeClr val="accent1"/>
+          </a:fillRef>
+          <a:effectRef idx="0">
+            <a:schemeClr val="accent1"/>
+          </a:effectRef>
+          <a:fontRef idx="minor">
+            <a:schemeClr val="lt1"/>
+          </a:fontRef>
+        </p:style>
+        <p:txBody>
+          <a:bodyPr wrap="none" lIns="0" tIns="0" rIns="0" bIns="0" rtlCol="0" anchor="ctr"/>
+          <a:lstStyle/>
+          <a:p>
+            <a:pPr algn="ctr"/>
+            <a:r>
+              <a:rPr lang="en-GB" sz="3600" dirty="0"/>
+              <a:t>D</a:t>
+            </a:r>
+          </a:p>
+        </p:txBody>
+      </p:sp>
+      <p:cxnSp>
+        <p:nvCxnSpPr>
+          <p:cNvPr id="10" name="Curved Connector 53">
+            <a:extLst>
+              <a:ext uri="{FF2B5EF4-FFF2-40B4-BE49-F238E27FC236}">
+                <a16:creationId xmlns:a16="http://schemas.microsoft.com/office/drawing/2014/main" id="{87E352BF-2888-4255-884F-0DAA2C475E24}"/>
+              </a:ext>
+            </a:extLst>
+          </p:cNvPr>
+          <p:cNvCxnSpPr>
+            <a:stCxn id="5" idx="0"/>
+            <a:endCxn id="9" idx="2"/>
+          </p:cNvCxnSpPr>
+          <p:nvPr/>
+        </p:nvCxnSpPr>
+        <p:spPr>
+          <a:xfrm rot="5400000" flipH="1" flipV="1">
+            <a:off x="2711704" y="610091"/>
+            <a:ext cx="789773" cy="1117088"/>
+          </a:xfrm>
+          <a:prstGeom prst="curvedConnector2">
+            <a:avLst/>
+          </a:prstGeom>
+          <a:ln w="88900">
+            <a:tailEnd type="triangle"/>
+          </a:ln>
+        </p:spPr>
+        <p:style>
+          <a:lnRef idx="1">
+            <a:schemeClr val="accent1"/>
+          </a:lnRef>
+          <a:fillRef idx="0">
+            <a:schemeClr val="accent1"/>
+          </a:fillRef>
+          <a:effectRef idx="0">
+            <a:schemeClr val="accent1"/>
+          </a:effectRef>
+          <a:fontRef idx="minor">
+            <a:schemeClr val="tx1"/>
+          </a:fontRef>
+        </p:style>
+      </p:cxnSp>
+      <p:sp>
+        <p:nvSpPr>
+          <p:cNvPr id="14" name="Oval 47">
+            <a:extLst>
+              <a:ext uri="{FF2B5EF4-FFF2-40B4-BE49-F238E27FC236}">
+                <a16:creationId xmlns:a16="http://schemas.microsoft.com/office/drawing/2014/main" id="{B543FE65-40BE-4B96-9B2E-DB34D278AE93}"/>
+              </a:ext>
+            </a:extLst>
+          </p:cNvPr>
+          <p:cNvSpPr/>
+          <p:nvPr/>
+        </p:nvSpPr>
+        <p:spPr>
+          <a:xfrm>
+            <a:off x="746262" y="5450212"/>
+            <a:ext cx="684695" cy="684695"/>
+          </a:xfrm>
+          <a:prstGeom prst="ellipse">
+            <a:avLst/>
+          </a:prstGeom>
+          <a:solidFill>
+            <a:srgbClr val="FF820A"/>
+          </a:solidFill>
+          <a:ln>
+            <a:noFill/>
+          </a:ln>
+        </p:spPr>
+        <p:style>
+          <a:lnRef idx="2">
+            <a:schemeClr val="accent1">
+              <a:shade val="50000"/>
+            </a:schemeClr>
+          </a:lnRef>
+          <a:fillRef idx="1">
+            <a:schemeClr val="accent1"/>
+          </a:fillRef>
+          <a:effectRef idx="0">
+            <a:schemeClr val="accent1"/>
+          </a:effectRef>
+          <a:fontRef idx="minor">
+            <a:schemeClr val="lt1"/>
+          </a:fontRef>
+        </p:style>
+        <p:txBody>
+          <a:bodyPr wrap="none" lIns="0" tIns="0" rIns="0" bIns="0" rtlCol="0" anchor="ctr"/>
+          <a:lstStyle/>
+          <a:p>
+            <a:pPr algn="ctr"/>
+            <a:r>
+              <a:rPr lang="en-GB" sz="3600" dirty="0"/>
+              <a:t>A</a:t>
+            </a:r>
+          </a:p>
+        </p:txBody>
+      </p:sp>
+      <p:sp>
+        <p:nvSpPr>
+          <p:cNvPr id="15" name="Oval 48">
+            <a:extLst>
+              <a:ext uri="{FF2B5EF4-FFF2-40B4-BE49-F238E27FC236}">
+                <a16:creationId xmlns:a16="http://schemas.microsoft.com/office/drawing/2014/main" id="{2A96A9CF-9648-46CD-B001-28D238EE38CF}"/>
+              </a:ext>
+            </a:extLst>
+          </p:cNvPr>
+          <p:cNvSpPr/>
+          <p:nvPr/>
+        </p:nvSpPr>
+        <p:spPr>
+          <a:xfrm>
+            <a:off x="2205698" y="5450212"/>
+            <a:ext cx="684695" cy="684695"/>
+          </a:xfrm>
+          <a:prstGeom prst="ellipse">
+            <a:avLst/>
+          </a:prstGeom>
+          <a:solidFill>
+            <a:srgbClr val="FF820A"/>
+          </a:solidFill>
+          <a:ln>
+            <a:noFill/>
+          </a:ln>
+        </p:spPr>
+        <p:style>
+          <a:lnRef idx="2">
+            <a:schemeClr val="accent1">
+              <a:shade val="50000"/>
+            </a:schemeClr>
+          </a:lnRef>
+          <a:fillRef idx="1">
+            <a:schemeClr val="accent1"/>
+          </a:fillRef>
+          <a:effectRef idx="0">
+            <a:schemeClr val="accent1"/>
+          </a:effectRef>
+          <a:fontRef idx="minor">
+            <a:schemeClr val="lt1"/>
+          </a:fontRef>
+        </p:style>
+        <p:txBody>
+          <a:bodyPr wrap="none" lIns="0" tIns="0" rIns="0" bIns="0" rtlCol="0" anchor="ctr"/>
+          <a:lstStyle/>
+          <a:p>
+            <a:pPr algn="ctr"/>
+            <a:r>
+              <a:rPr lang="en-GB" sz="3600" dirty="0"/>
+              <a:t>B</a:t>
+            </a:r>
+          </a:p>
+        </p:txBody>
+      </p:sp>
+      <p:sp>
+        <p:nvSpPr>
+          <p:cNvPr id="16" name="Oval 49">
+            <a:extLst>
+              <a:ext uri="{FF2B5EF4-FFF2-40B4-BE49-F238E27FC236}">
+                <a16:creationId xmlns:a16="http://schemas.microsoft.com/office/drawing/2014/main" id="{009655AE-1AB4-4716-BF0A-9489CD43C174}"/>
+              </a:ext>
+            </a:extLst>
+          </p:cNvPr>
+          <p:cNvSpPr/>
+          <p:nvPr/>
+        </p:nvSpPr>
+        <p:spPr>
+          <a:xfrm>
+            <a:off x="3665134" y="5450211"/>
+            <a:ext cx="684695" cy="684695"/>
+          </a:xfrm>
+          <a:prstGeom prst="ellipse">
+            <a:avLst/>
+          </a:prstGeom>
+          <a:solidFill>
+            <a:srgbClr val="FF820A"/>
+          </a:solidFill>
+          <a:ln>
+            <a:noFill/>
+          </a:ln>
+        </p:spPr>
+        <p:style>
+          <a:lnRef idx="2">
+            <a:schemeClr val="accent1">
+              <a:shade val="50000"/>
+            </a:schemeClr>
+          </a:lnRef>
+          <a:fillRef idx="1">
+            <a:schemeClr val="accent1"/>
+          </a:fillRef>
+          <a:effectRef idx="0">
+            <a:schemeClr val="accent1"/>
+          </a:effectRef>
+          <a:fontRef idx="minor">
+            <a:schemeClr val="lt1"/>
+          </a:fontRef>
+        </p:style>
+        <p:txBody>
+          <a:bodyPr wrap="none" lIns="0" tIns="0" rIns="0" bIns="0" rtlCol="0" anchor="ctr"/>
+          <a:lstStyle/>
+          <a:p>
+            <a:pPr algn="ctr"/>
+            <a:r>
+              <a:rPr lang="en-GB" sz="3600" dirty="0"/>
+              <a:t>C</a:t>
+            </a:r>
+          </a:p>
+        </p:txBody>
+      </p:sp>
+      <p:cxnSp>
+        <p:nvCxnSpPr>
+          <p:cNvPr id="17" name="Straight Arrow Connector 50">
+            <a:extLst>
+              <a:ext uri="{FF2B5EF4-FFF2-40B4-BE49-F238E27FC236}">
+                <a16:creationId xmlns:a16="http://schemas.microsoft.com/office/drawing/2014/main" id="{EF977448-2628-4160-9151-7BFC8A7254EB}"/>
+              </a:ext>
+            </a:extLst>
+          </p:cNvPr>
+          <p:cNvCxnSpPr>
+            <a:stCxn id="14" idx="6"/>
+            <a:endCxn id="15" idx="2"/>
+          </p:cNvCxnSpPr>
+          <p:nvPr/>
+        </p:nvCxnSpPr>
+        <p:spPr>
+          <a:xfrm>
+            <a:off x="1430957" y="5792560"/>
+            <a:ext cx="774741" cy="0"/>
+          </a:xfrm>
+          <a:prstGeom prst="straightConnector1">
+            <a:avLst/>
+          </a:prstGeom>
+          <a:ln w="88900">
+            <a:tailEnd type="triangle"/>
+          </a:ln>
+        </p:spPr>
+        <p:style>
+          <a:lnRef idx="1">
+            <a:schemeClr val="accent1"/>
+          </a:lnRef>
+          <a:fillRef idx="0">
+            <a:schemeClr val="accent1"/>
+          </a:fillRef>
+          <a:effectRef idx="0">
+            <a:schemeClr val="accent1"/>
+          </a:effectRef>
+          <a:fontRef idx="minor">
+            <a:schemeClr val="tx1"/>
+          </a:fontRef>
+        </p:style>
+      </p:cxnSp>
+      <p:cxnSp>
+        <p:nvCxnSpPr>
+          <p:cNvPr id="18" name="Straight Arrow Connector 51">
+            <a:extLst>
+              <a:ext uri="{FF2B5EF4-FFF2-40B4-BE49-F238E27FC236}">
+                <a16:creationId xmlns:a16="http://schemas.microsoft.com/office/drawing/2014/main" id="{2BE1B6C3-1427-4953-81C8-782149113044}"/>
+              </a:ext>
+            </a:extLst>
+          </p:cNvPr>
+          <p:cNvCxnSpPr>
+            <a:stCxn id="15" idx="6"/>
+            <a:endCxn id="16" idx="2"/>
+          </p:cNvCxnSpPr>
+          <p:nvPr/>
+        </p:nvCxnSpPr>
+        <p:spPr>
+          <a:xfrm flipV="1">
+            <a:off x="2890393" y="5792559"/>
+            <a:ext cx="774741" cy="1"/>
+          </a:xfrm>
+          <a:prstGeom prst="straightConnector1">
+            <a:avLst/>
+          </a:prstGeom>
+          <a:ln w="88900">
+            <a:tailEnd type="triangle"/>
+          </a:ln>
+        </p:spPr>
+        <p:style>
+          <a:lnRef idx="1">
+            <a:schemeClr val="accent1"/>
+          </a:lnRef>
+          <a:fillRef idx="0">
+            <a:schemeClr val="accent1"/>
+          </a:fillRef>
+          <a:effectRef idx="0">
+            <a:schemeClr val="accent1"/>
+          </a:effectRef>
+          <a:fontRef idx="minor">
+            <a:schemeClr val="tx1"/>
+          </a:fontRef>
+        </p:style>
+      </p:cxnSp>
+      <p:sp>
+        <p:nvSpPr>
+          <p:cNvPr id="19" name="Oval 52">
+            <a:extLst>
+              <a:ext uri="{FF2B5EF4-FFF2-40B4-BE49-F238E27FC236}">
+                <a16:creationId xmlns:a16="http://schemas.microsoft.com/office/drawing/2014/main" id="{8C90F587-289F-4FA5-AAA5-3E6585C6927E}"/>
+              </a:ext>
+            </a:extLst>
+          </p:cNvPr>
+          <p:cNvSpPr/>
+          <p:nvPr/>
+        </p:nvSpPr>
+        <p:spPr>
+          <a:xfrm>
+            <a:off x="3665134" y="4318091"/>
+            <a:ext cx="684695" cy="684695"/>
+          </a:xfrm>
+          <a:prstGeom prst="ellipse">
+            <a:avLst/>
+          </a:prstGeom>
+          <a:solidFill>
+            <a:srgbClr val="FF820A"/>
+          </a:solidFill>
+          <a:ln>
+            <a:noFill/>
+          </a:ln>
+        </p:spPr>
+        <p:style>
+          <a:lnRef idx="2">
+            <a:schemeClr val="accent1">
+              <a:shade val="50000"/>
+            </a:schemeClr>
+          </a:lnRef>
+          <a:fillRef idx="1">
+            <a:schemeClr val="accent1"/>
+          </a:fillRef>
+          <a:effectRef idx="0">
+            <a:schemeClr val="accent1"/>
+          </a:effectRef>
+          <a:fontRef idx="minor">
+            <a:schemeClr val="lt1"/>
+          </a:fontRef>
+        </p:style>
+        <p:txBody>
+          <a:bodyPr wrap="none" lIns="0" tIns="0" rIns="0" bIns="0" rtlCol="0" anchor="ctr"/>
+          <a:lstStyle/>
+          <a:p>
+            <a:pPr algn="ctr"/>
+            <a:r>
+              <a:rPr lang="en-GB" sz="3600" dirty="0"/>
+              <a:t>D</a:t>
+            </a:r>
+          </a:p>
+        </p:txBody>
+      </p:sp>
+      <p:cxnSp>
+        <p:nvCxnSpPr>
+          <p:cNvPr id="20" name="Curved Connector 53">
+            <a:extLst>
+              <a:ext uri="{FF2B5EF4-FFF2-40B4-BE49-F238E27FC236}">
+                <a16:creationId xmlns:a16="http://schemas.microsoft.com/office/drawing/2014/main" id="{92A697B5-6CBF-4799-8FA3-2B3A5867C74B}"/>
+              </a:ext>
+            </a:extLst>
+          </p:cNvPr>
+          <p:cNvCxnSpPr>
+            <a:stCxn id="15" idx="0"/>
+            <a:endCxn id="19" idx="2"/>
+          </p:cNvCxnSpPr>
+          <p:nvPr/>
+        </p:nvCxnSpPr>
+        <p:spPr>
+          <a:xfrm rot="5400000" flipH="1" flipV="1">
+            <a:off x="2711704" y="4496782"/>
+            <a:ext cx="789773" cy="1117088"/>
+          </a:xfrm>
+          <a:prstGeom prst="curvedConnector2">
+            <a:avLst/>
+          </a:prstGeom>
+          <a:ln w="88900">
+            <a:tailEnd type="triangle"/>
+          </a:ln>
+        </p:spPr>
+        <p:style>
+          <a:lnRef idx="1">
+            <a:schemeClr val="accent1"/>
+          </a:lnRef>
+          <a:fillRef idx="0">
+            <a:schemeClr val="accent1"/>
+          </a:fillRef>
+          <a:effectRef idx="0">
+            <a:schemeClr val="accent1"/>
+          </a:effectRef>
+          <a:fontRef idx="minor">
+            <a:schemeClr val="tx1"/>
+          </a:fontRef>
+        </p:style>
+      </p:cxnSp>
+      <p:sp>
+        <p:nvSpPr>
+          <p:cNvPr id="23" name="Oval 49">
+            <a:extLst>
+              <a:ext uri="{FF2B5EF4-FFF2-40B4-BE49-F238E27FC236}">
+                <a16:creationId xmlns:a16="http://schemas.microsoft.com/office/drawing/2014/main" id="{733640EC-F840-4CD6-8950-A983CC28ED67}"/>
+              </a:ext>
+            </a:extLst>
+          </p:cNvPr>
+          <p:cNvSpPr/>
+          <p:nvPr/>
+        </p:nvSpPr>
+        <p:spPr>
+          <a:xfrm>
+            <a:off x="5124570" y="5450210"/>
+            <a:ext cx="684695" cy="684695"/>
+          </a:xfrm>
+          <a:prstGeom prst="ellipse">
+            <a:avLst/>
+          </a:prstGeom>
+          <a:solidFill>
+            <a:srgbClr val="FF820A"/>
+          </a:solidFill>
+          <a:ln>
+            <a:noFill/>
+          </a:ln>
+        </p:spPr>
+        <p:style>
+          <a:lnRef idx="2">
+            <a:schemeClr val="accent1">
+              <a:shade val="50000"/>
+            </a:schemeClr>
+          </a:lnRef>
+          <a:fillRef idx="1">
+            <a:schemeClr val="accent1"/>
+          </a:fillRef>
+          <a:effectRef idx="0">
+            <a:schemeClr val="accent1"/>
+          </a:effectRef>
+          <a:fontRef idx="minor">
+            <a:schemeClr val="lt1"/>
+          </a:fontRef>
+        </p:style>
+        <p:txBody>
+          <a:bodyPr wrap="none" lIns="0" tIns="0" rIns="0" bIns="0" rtlCol="0" anchor="ctr"/>
+          <a:lstStyle/>
+          <a:p>
+            <a:pPr algn="ctr"/>
+            <a:r>
+              <a:rPr lang="en-GB" sz="3600" dirty="0"/>
+              <a:t>E</a:t>
+            </a:r>
+          </a:p>
+        </p:txBody>
+      </p:sp>
+      <p:cxnSp>
+        <p:nvCxnSpPr>
+          <p:cNvPr id="24" name="Straight Arrow Connector 51">
+            <a:extLst>
+              <a:ext uri="{FF2B5EF4-FFF2-40B4-BE49-F238E27FC236}">
+                <a16:creationId xmlns:a16="http://schemas.microsoft.com/office/drawing/2014/main" id="{D1B49C1F-FC6A-42E3-8D71-ACAF7DF4C75F}"/>
+              </a:ext>
+            </a:extLst>
+          </p:cNvPr>
+          <p:cNvCxnSpPr/>
+          <p:nvPr/>
+        </p:nvCxnSpPr>
+        <p:spPr>
+          <a:xfrm flipV="1">
+            <a:off x="4349829" y="5792557"/>
+            <a:ext cx="774741" cy="1"/>
+          </a:xfrm>
+          <a:prstGeom prst="straightConnector1">
+            <a:avLst/>
+          </a:prstGeom>
+          <a:ln w="88900">
+            <a:tailEnd type="triangle"/>
+          </a:ln>
+        </p:spPr>
+        <p:style>
+          <a:lnRef idx="1">
+            <a:schemeClr val="accent1"/>
+          </a:lnRef>
+          <a:fillRef idx="0">
+            <a:schemeClr val="accent1"/>
+          </a:fillRef>
+          <a:effectRef idx="0">
+            <a:schemeClr val="accent1"/>
+          </a:effectRef>
+          <a:fontRef idx="minor">
+            <a:schemeClr val="tx1"/>
+          </a:fontRef>
+        </p:style>
+      </p:cxnSp>
+      <p:cxnSp>
+        <p:nvCxnSpPr>
+          <p:cNvPr id="31" name="Curved Connector 53">
+            <a:extLst>
+              <a:ext uri="{FF2B5EF4-FFF2-40B4-BE49-F238E27FC236}">
+                <a16:creationId xmlns:a16="http://schemas.microsoft.com/office/drawing/2014/main" id="{45A3A97B-2CB0-437A-B0BF-3706B490BCB9}"/>
+              </a:ext>
+            </a:extLst>
+          </p:cNvPr>
+          <p:cNvCxnSpPr>
+            <a:cxnSpLocks/>
+            <a:stCxn id="19" idx="6"/>
+            <a:endCxn id="23" idx="0"/>
+          </p:cNvCxnSpPr>
+          <p:nvPr/>
+        </p:nvCxnSpPr>
+        <p:spPr>
+          <a:xfrm>
+            <a:off x="4349829" y="4660439"/>
+            <a:ext cx="1117089" cy="789771"/>
+          </a:xfrm>
+          <a:prstGeom prst="curvedConnector2">
+            <a:avLst/>
+          </a:prstGeom>
+          <a:ln w="88900">
+            <a:tailEnd type="triangle"/>
+          </a:ln>
+        </p:spPr>
+        <p:style>
+          <a:lnRef idx="1">
+            <a:schemeClr val="accent1"/>
+          </a:lnRef>
+          <a:fillRef idx="0">
+            <a:schemeClr val="accent1"/>
+          </a:fillRef>
+          <a:effectRef idx="0">
+            <a:schemeClr val="accent1"/>
+          </a:effectRef>
+          <a:fontRef idx="minor">
+            <a:schemeClr val="tx1"/>
+          </a:fontRef>
+        </p:style>
+      </p:cxnSp>
+      <p:sp>
+        <p:nvSpPr>
+          <p:cNvPr id="37" name="Down Arrow Callout 67">
+            <a:extLst>
+              <a:ext uri="{FF2B5EF4-FFF2-40B4-BE49-F238E27FC236}">
+                <a16:creationId xmlns:a16="http://schemas.microsoft.com/office/drawing/2014/main" id="{1B7BCFE3-E2D2-43D2-BFCA-BA9FFC64283F}"/>
+              </a:ext>
+            </a:extLst>
+          </p:cNvPr>
+          <p:cNvSpPr/>
+          <p:nvPr/>
+        </p:nvSpPr>
+        <p:spPr>
+          <a:xfrm>
+            <a:off x="3353827" y="-284806"/>
+            <a:ext cx="1307308" cy="716205"/>
+          </a:xfrm>
+          <a:prstGeom prst="downArrowCallout">
+            <a:avLst>
+              <a:gd name="adj1" fmla="val 18711"/>
+              <a:gd name="adj2" fmla="val 18711"/>
+              <a:gd name="adj3" fmla="val 25000"/>
+              <a:gd name="adj4" fmla="val 64977"/>
+            </a:avLst>
+          </a:prstGeom>
+          <a:solidFill>
+            <a:srgbClr val="FEB080"/>
+          </a:solidFill>
+          <a:ln>
+            <a:noFill/>
+          </a:ln>
+        </p:spPr>
+        <p:style>
+          <a:lnRef idx="2">
+            <a:schemeClr val="accent1">
+              <a:shade val="50000"/>
+            </a:schemeClr>
+          </a:lnRef>
+          <a:fillRef idx="1">
+            <a:schemeClr val="accent1"/>
+          </a:fillRef>
+          <a:effectRef idx="0">
+            <a:schemeClr val="accent1"/>
+          </a:effectRef>
+          <a:fontRef idx="minor">
+            <a:schemeClr val="lt1"/>
+          </a:fontRef>
+        </p:style>
+        <p:txBody>
+          <a:bodyPr rtlCol="0" anchor="ctr"/>
+          <a:lstStyle/>
+          <a:p>
+            <a:pPr algn="ctr"/>
+            <a:r>
+              <a:rPr lang="en-GB" sz="2400" dirty="0"/>
+              <a:t>feature</a:t>
+            </a:r>
+          </a:p>
+        </p:txBody>
+      </p:sp>
+      <p:sp>
+        <p:nvSpPr>
+          <p:cNvPr id="38" name="Down Arrow Callout 67">
+            <a:extLst>
+              <a:ext uri="{FF2B5EF4-FFF2-40B4-BE49-F238E27FC236}">
+                <a16:creationId xmlns:a16="http://schemas.microsoft.com/office/drawing/2014/main" id="{34ED3643-0904-4AF2-8485-499526849FB4}"/>
+              </a:ext>
+            </a:extLst>
+          </p:cNvPr>
+          <p:cNvSpPr/>
+          <p:nvPr/>
+        </p:nvSpPr>
+        <p:spPr>
+          <a:xfrm>
+            <a:off x="3353827" y="3597844"/>
+            <a:ext cx="1307308" cy="716205"/>
+          </a:xfrm>
+          <a:prstGeom prst="downArrowCallout">
+            <a:avLst>
+              <a:gd name="adj1" fmla="val 18711"/>
+              <a:gd name="adj2" fmla="val 18711"/>
+              <a:gd name="adj3" fmla="val 25000"/>
+              <a:gd name="adj4" fmla="val 64977"/>
+            </a:avLst>
+          </a:prstGeom>
+          <a:solidFill>
+            <a:srgbClr val="FEB080"/>
+          </a:solidFill>
+          <a:ln>
+            <a:noFill/>
+          </a:ln>
+        </p:spPr>
+        <p:style>
+          <a:lnRef idx="2">
+            <a:schemeClr val="accent1">
+              <a:shade val="50000"/>
+            </a:schemeClr>
+          </a:lnRef>
+          <a:fillRef idx="1">
+            <a:schemeClr val="accent1"/>
+          </a:fillRef>
+          <a:effectRef idx="0">
+            <a:schemeClr val="accent1"/>
+          </a:effectRef>
+          <a:fontRef idx="minor">
+            <a:schemeClr val="lt1"/>
+          </a:fontRef>
+        </p:style>
+        <p:txBody>
+          <a:bodyPr rtlCol="0" anchor="ctr"/>
+          <a:lstStyle/>
+          <a:p>
+            <a:pPr algn="ctr"/>
+            <a:r>
+              <a:rPr lang="en-GB" sz="2400" dirty="0"/>
+              <a:t>feature</a:t>
+            </a:r>
+          </a:p>
+        </p:txBody>
+      </p:sp>
+      <p:sp>
+        <p:nvSpPr>
+          <p:cNvPr id="39" name="Down Arrow Callout 67">
+            <a:extLst>
+              <a:ext uri="{FF2B5EF4-FFF2-40B4-BE49-F238E27FC236}">
+                <a16:creationId xmlns:a16="http://schemas.microsoft.com/office/drawing/2014/main" id="{DCCE811E-D0F5-4520-8C22-62E64FCF635B}"/>
+              </a:ext>
+            </a:extLst>
+          </p:cNvPr>
+          <p:cNvSpPr/>
+          <p:nvPr/>
+        </p:nvSpPr>
+        <p:spPr>
+          <a:xfrm>
+            <a:off x="3353827" y="2248214"/>
+            <a:ext cx="1307308" cy="716205"/>
+          </a:xfrm>
+          <a:prstGeom prst="upArrowCallout">
+            <a:avLst>
+              <a:gd name="adj1" fmla="val 15116"/>
+              <a:gd name="adj2" fmla="val 18410"/>
+              <a:gd name="adj3" fmla="val 25000"/>
+              <a:gd name="adj4" fmla="val 64977"/>
+            </a:avLst>
+          </a:prstGeom>
+          <a:solidFill>
+            <a:srgbClr val="FEB080"/>
+          </a:solidFill>
+          <a:ln>
+            <a:noFill/>
+          </a:ln>
+        </p:spPr>
+        <p:style>
+          <a:lnRef idx="2">
+            <a:schemeClr val="accent1">
+              <a:shade val="50000"/>
+            </a:schemeClr>
+          </a:lnRef>
+          <a:fillRef idx="1">
+            <a:schemeClr val="accent1"/>
+          </a:fillRef>
+          <a:effectRef idx="0">
+            <a:schemeClr val="accent1"/>
+          </a:effectRef>
+          <a:fontRef idx="minor">
+            <a:schemeClr val="lt1"/>
+          </a:fontRef>
+        </p:style>
+        <p:txBody>
+          <a:bodyPr rtlCol="0" anchor="ctr"/>
+          <a:lstStyle/>
+          <a:p>
+            <a:pPr algn="ctr"/>
+            <a:r>
+              <a:rPr lang="en-GB" sz="2400" dirty="0"/>
+              <a:t>master</a:t>
+            </a:r>
+          </a:p>
+        </p:txBody>
+      </p:sp>
+      <p:sp>
+        <p:nvSpPr>
+          <p:cNvPr id="40" name="Down Arrow Callout 67">
+            <a:extLst>
+              <a:ext uri="{FF2B5EF4-FFF2-40B4-BE49-F238E27FC236}">
+                <a16:creationId xmlns:a16="http://schemas.microsoft.com/office/drawing/2014/main" id="{3DFB7D24-2801-4E6B-990D-49FA12B213E4}"/>
+              </a:ext>
+            </a:extLst>
+          </p:cNvPr>
+          <p:cNvSpPr/>
+          <p:nvPr/>
+        </p:nvSpPr>
+        <p:spPr>
+          <a:xfrm>
+            <a:off x="4813263" y="6134904"/>
+            <a:ext cx="1307308" cy="716205"/>
+          </a:xfrm>
+          <a:prstGeom prst="upArrowCallout">
+            <a:avLst>
+              <a:gd name="adj1" fmla="val 15116"/>
+              <a:gd name="adj2" fmla="val 18410"/>
+              <a:gd name="adj3" fmla="val 25000"/>
+              <a:gd name="adj4" fmla="val 64977"/>
+            </a:avLst>
+          </a:prstGeom>
+          <a:solidFill>
+            <a:srgbClr val="FEB080"/>
+          </a:solidFill>
+          <a:ln>
+            <a:noFill/>
+          </a:ln>
+        </p:spPr>
+        <p:style>
+          <a:lnRef idx="2">
+            <a:schemeClr val="accent1">
+              <a:shade val="50000"/>
+            </a:schemeClr>
+          </a:lnRef>
+          <a:fillRef idx="1">
+            <a:schemeClr val="accent1"/>
+          </a:fillRef>
+          <a:effectRef idx="0">
+            <a:schemeClr val="accent1"/>
+          </a:effectRef>
+          <a:fontRef idx="minor">
+            <a:schemeClr val="lt1"/>
+          </a:fontRef>
+        </p:style>
+        <p:txBody>
+          <a:bodyPr rtlCol="0" anchor="ctr"/>
+          <a:lstStyle/>
+          <a:p>
+            <a:pPr algn="ctr"/>
+            <a:r>
+              <a:rPr lang="en-GB" sz="2400" dirty="0"/>
+              <a:t>master</a:t>
+            </a:r>
+          </a:p>
+        </p:txBody>
+      </p:sp>
+      <p:sp>
+        <p:nvSpPr>
+          <p:cNvPr id="41" name="Oval 47">
+            <a:extLst>
+              <a:ext uri="{FF2B5EF4-FFF2-40B4-BE49-F238E27FC236}">
+                <a16:creationId xmlns:a16="http://schemas.microsoft.com/office/drawing/2014/main" id="{19D629A3-9CF0-4D29-B29F-3B8B0F2F9315}"/>
+              </a:ext>
+            </a:extLst>
+          </p:cNvPr>
+          <p:cNvSpPr/>
+          <p:nvPr/>
+        </p:nvSpPr>
+        <p:spPr>
+          <a:xfrm>
+            <a:off x="6120571" y="2887627"/>
+            <a:ext cx="684695" cy="684695"/>
+          </a:xfrm>
+          <a:prstGeom prst="ellipse">
+            <a:avLst/>
+          </a:prstGeom>
+          <a:solidFill>
+            <a:srgbClr val="FF820A"/>
+          </a:solidFill>
+          <a:ln>
+            <a:noFill/>
+          </a:ln>
+        </p:spPr>
+        <p:style>
+          <a:lnRef idx="2">
+            <a:schemeClr val="accent1">
+              <a:shade val="50000"/>
+            </a:schemeClr>
+          </a:lnRef>
+          <a:fillRef idx="1">
+            <a:schemeClr val="accent1"/>
+          </a:fillRef>
+          <a:effectRef idx="0">
+            <a:schemeClr val="accent1"/>
+          </a:effectRef>
+          <a:fontRef idx="minor">
+            <a:schemeClr val="lt1"/>
+          </a:fontRef>
+        </p:style>
+        <p:txBody>
+          <a:bodyPr wrap="none" lIns="0" tIns="0" rIns="0" bIns="0" rtlCol="0" anchor="ctr"/>
+          <a:lstStyle/>
+          <a:p>
+            <a:pPr algn="ctr"/>
+            <a:r>
+              <a:rPr lang="en-GB" sz="3600" dirty="0"/>
+              <a:t>A</a:t>
+            </a:r>
+          </a:p>
+        </p:txBody>
+      </p:sp>
+      <p:sp>
+        <p:nvSpPr>
+          <p:cNvPr id="42" name="Oval 48">
+            <a:extLst>
+              <a:ext uri="{FF2B5EF4-FFF2-40B4-BE49-F238E27FC236}">
+                <a16:creationId xmlns:a16="http://schemas.microsoft.com/office/drawing/2014/main" id="{6098235F-1489-4D64-A13D-F3539FB48F90}"/>
+              </a:ext>
+            </a:extLst>
+          </p:cNvPr>
+          <p:cNvSpPr/>
+          <p:nvPr/>
+        </p:nvSpPr>
+        <p:spPr>
+          <a:xfrm>
+            <a:off x="7580007" y="2887627"/>
+            <a:ext cx="684695" cy="684695"/>
+          </a:xfrm>
+          <a:prstGeom prst="ellipse">
+            <a:avLst/>
+          </a:prstGeom>
+          <a:solidFill>
+            <a:srgbClr val="FF820A"/>
+          </a:solidFill>
+          <a:ln>
+            <a:noFill/>
+          </a:ln>
+        </p:spPr>
+        <p:style>
+          <a:lnRef idx="2">
+            <a:schemeClr val="accent1">
+              <a:shade val="50000"/>
+            </a:schemeClr>
+          </a:lnRef>
+          <a:fillRef idx="1">
+            <a:schemeClr val="accent1"/>
+          </a:fillRef>
+          <a:effectRef idx="0">
+            <a:schemeClr val="accent1"/>
+          </a:effectRef>
+          <a:fontRef idx="minor">
+            <a:schemeClr val="lt1"/>
+          </a:fontRef>
+        </p:style>
+        <p:txBody>
+          <a:bodyPr wrap="none" lIns="0" tIns="0" rIns="0" bIns="0" rtlCol="0" anchor="ctr"/>
+          <a:lstStyle/>
+          <a:p>
+            <a:pPr algn="ctr"/>
+            <a:r>
+              <a:rPr lang="en-GB" sz="3600" dirty="0"/>
+              <a:t>B</a:t>
+            </a:r>
+          </a:p>
+        </p:txBody>
+      </p:sp>
+      <p:sp>
+        <p:nvSpPr>
+          <p:cNvPr id="43" name="Oval 49">
+            <a:extLst>
+              <a:ext uri="{FF2B5EF4-FFF2-40B4-BE49-F238E27FC236}">
+                <a16:creationId xmlns:a16="http://schemas.microsoft.com/office/drawing/2014/main" id="{DFA25E9C-706A-4955-AC89-ABC38FA5670E}"/>
+              </a:ext>
+            </a:extLst>
+          </p:cNvPr>
+          <p:cNvSpPr/>
+          <p:nvPr/>
+        </p:nvSpPr>
+        <p:spPr>
+          <a:xfrm>
+            <a:off x="9039443" y="2887626"/>
+            <a:ext cx="684695" cy="684695"/>
+          </a:xfrm>
+          <a:prstGeom prst="ellipse">
+            <a:avLst/>
+          </a:prstGeom>
+          <a:solidFill>
+            <a:srgbClr val="FF820A"/>
+          </a:solidFill>
+          <a:ln>
+            <a:noFill/>
+          </a:ln>
+        </p:spPr>
+        <p:style>
+          <a:lnRef idx="2">
+            <a:schemeClr val="accent1">
+              <a:shade val="50000"/>
+            </a:schemeClr>
+          </a:lnRef>
+          <a:fillRef idx="1">
+            <a:schemeClr val="accent1"/>
+          </a:fillRef>
+          <a:effectRef idx="0">
+            <a:schemeClr val="accent1"/>
+          </a:effectRef>
+          <a:fontRef idx="minor">
+            <a:schemeClr val="lt1"/>
+          </a:fontRef>
+        </p:style>
+        <p:txBody>
+          <a:bodyPr wrap="none" lIns="0" tIns="0" rIns="0" bIns="0" rtlCol="0" anchor="ctr"/>
+          <a:lstStyle/>
+          <a:p>
+            <a:pPr algn="ctr"/>
+            <a:r>
+              <a:rPr lang="en-GB" sz="3600" dirty="0"/>
+              <a:t>C</a:t>
+            </a:r>
+          </a:p>
+        </p:txBody>
+      </p:sp>
+      <p:cxnSp>
+        <p:nvCxnSpPr>
+          <p:cNvPr id="44" name="Straight Arrow Connector 50">
+            <a:extLst>
+              <a:ext uri="{FF2B5EF4-FFF2-40B4-BE49-F238E27FC236}">
+                <a16:creationId xmlns:a16="http://schemas.microsoft.com/office/drawing/2014/main" id="{06650017-06A2-45C1-9BF5-780C60535794}"/>
+              </a:ext>
+            </a:extLst>
+          </p:cNvPr>
+          <p:cNvCxnSpPr>
+            <a:stCxn id="41" idx="6"/>
+            <a:endCxn id="42" idx="2"/>
+          </p:cNvCxnSpPr>
+          <p:nvPr/>
+        </p:nvCxnSpPr>
+        <p:spPr>
+          <a:xfrm>
+            <a:off x="6805266" y="3229975"/>
+            <a:ext cx="774741" cy="0"/>
+          </a:xfrm>
+          <a:prstGeom prst="straightConnector1">
+            <a:avLst/>
+          </a:prstGeom>
+          <a:ln w="88900">
+            <a:tailEnd type="triangle"/>
+          </a:ln>
+        </p:spPr>
+        <p:style>
+          <a:lnRef idx="1">
+            <a:schemeClr val="accent1"/>
+          </a:lnRef>
+          <a:fillRef idx="0">
+            <a:schemeClr val="accent1"/>
+          </a:fillRef>
+          <a:effectRef idx="0">
+            <a:schemeClr val="accent1"/>
+          </a:effectRef>
+          <a:fontRef idx="minor">
+            <a:schemeClr val="tx1"/>
+          </a:fontRef>
+        </p:style>
+      </p:cxnSp>
+      <p:cxnSp>
+        <p:nvCxnSpPr>
+          <p:cNvPr id="45" name="Straight Arrow Connector 51">
+            <a:extLst>
+              <a:ext uri="{FF2B5EF4-FFF2-40B4-BE49-F238E27FC236}">
+                <a16:creationId xmlns:a16="http://schemas.microsoft.com/office/drawing/2014/main" id="{7E83C48F-68A5-4159-B7A6-83290C668028}"/>
+              </a:ext>
+            </a:extLst>
+          </p:cNvPr>
+          <p:cNvCxnSpPr>
+            <a:stCxn id="42" idx="6"/>
+            <a:endCxn id="43" idx="2"/>
+          </p:cNvCxnSpPr>
+          <p:nvPr/>
+        </p:nvCxnSpPr>
+        <p:spPr>
+          <a:xfrm flipV="1">
+            <a:off x="8264702" y="3229974"/>
+            <a:ext cx="774741" cy="1"/>
+          </a:xfrm>
+          <a:prstGeom prst="straightConnector1">
+            <a:avLst/>
+          </a:prstGeom>
+          <a:ln w="88900">
+            <a:tailEnd type="triangle"/>
+          </a:ln>
+        </p:spPr>
+        <p:style>
+          <a:lnRef idx="1">
+            <a:schemeClr val="accent1"/>
+          </a:lnRef>
+          <a:fillRef idx="0">
+            <a:schemeClr val="accent1"/>
+          </a:fillRef>
+          <a:effectRef idx="0">
+            <a:schemeClr val="accent1"/>
+          </a:effectRef>
+          <a:fontRef idx="minor">
+            <a:schemeClr val="tx1"/>
+          </a:fontRef>
+        </p:style>
+      </p:cxnSp>
+      <p:sp>
+        <p:nvSpPr>
+          <p:cNvPr id="46" name="Oval 52">
+            <a:extLst>
+              <a:ext uri="{FF2B5EF4-FFF2-40B4-BE49-F238E27FC236}">
+                <a16:creationId xmlns:a16="http://schemas.microsoft.com/office/drawing/2014/main" id="{3AE6FE8B-F35E-4C1F-B774-70BE0D7A99DC}"/>
+              </a:ext>
+            </a:extLst>
+          </p:cNvPr>
+          <p:cNvSpPr/>
+          <p:nvPr/>
+        </p:nvSpPr>
+        <p:spPr>
+          <a:xfrm>
+            <a:off x="9039443" y="1755506"/>
+            <a:ext cx="684695" cy="684695"/>
+          </a:xfrm>
+          <a:prstGeom prst="ellipse">
+            <a:avLst/>
+          </a:prstGeom>
+          <a:solidFill>
+            <a:srgbClr val="FF820A">
+              <a:alpha val="30000"/>
+            </a:srgbClr>
+          </a:solidFill>
+          <a:ln>
+            <a:noFill/>
+          </a:ln>
+        </p:spPr>
+        <p:style>
+          <a:lnRef idx="2">
+            <a:schemeClr val="accent1">
+              <a:shade val="50000"/>
+            </a:schemeClr>
+          </a:lnRef>
+          <a:fillRef idx="1">
+            <a:schemeClr val="accent1"/>
+          </a:fillRef>
+          <a:effectRef idx="0">
+            <a:schemeClr val="accent1"/>
+          </a:effectRef>
+          <a:fontRef idx="minor">
+            <a:schemeClr val="lt1"/>
+          </a:fontRef>
+        </p:style>
+        <p:txBody>
+          <a:bodyPr wrap="none" lIns="0" tIns="0" rIns="0" bIns="0" rtlCol="0" anchor="ctr"/>
+          <a:lstStyle/>
+          <a:p>
+            <a:pPr algn="ctr"/>
+            <a:r>
+              <a:rPr lang="en-GB" sz="3600" dirty="0"/>
+              <a:t>D</a:t>
+            </a:r>
+          </a:p>
+        </p:txBody>
+      </p:sp>
+      <p:cxnSp>
+        <p:nvCxnSpPr>
+          <p:cNvPr id="47" name="Curved Connector 53">
+            <a:extLst>
+              <a:ext uri="{FF2B5EF4-FFF2-40B4-BE49-F238E27FC236}">
+                <a16:creationId xmlns:a16="http://schemas.microsoft.com/office/drawing/2014/main" id="{A4D1CF3B-656A-4509-BD29-4D1B750010FC}"/>
+              </a:ext>
+            </a:extLst>
+          </p:cNvPr>
+          <p:cNvCxnSpPr>
+            <a:stCxn id="42" idx="0"/>
+            <a:endCxn id="46" idx="2"/>
+          </p:cNvCxnSpPr>
+          <p:nvPr/>
+        </p:nvCxnSpPr>
+        <p:spPr>
+          <a:xfrm rot="5400000" flipH="1" flipV="1">
+            <a:off x="8086013" y="1934197"/>
+            <a:ext cx="789773" cy="1117088"/>
+          </a:xfrm>
+          <a:prstGeom prst="curvedConnector2">
+            <a:avLst/>
+          </a:prstGeom>
+          <a:ln w="88900">
+            <a:solidFill>
+              <a:schemeClr val="accent1">
+                <a:alpha val="30000"/>
+              </a:schemeClr>
+            </a:solidFill>
+            <a:tailEnd type="triangle"/>
+          </a:ln>
+        </p:spPr>
+        <p:style>
+          <a:lnRef idx="1">
+            <a:schemeClr val="accent1"/>
+          </a:lnRef>
+          <a:fillRef idx="0">
+            <a:schemeClr val="accent1"/>
+          </a:fillRef>
+          <a:effectRef idx="0">
+            <a:schemeClr val="accent1"/>
+          </a:effectRef>
+          <a:fontRef idx="minor">
+            <a:schemeClr val="tx1"/>
+          </a:fontRef>
+        </p:style>
+      </p:cxnSp>
+      <p:sp>
+        <p:nvSpPr>
+          <p:cNvPr id="48" name="Down Arrow Callout 67">
+            <a:extLst>
+              <a:ext uri="{FF2B5EF4-FFF2-40B4-BE49-F238E27FC236}">
+                <a16:creationId xmlns:a16="http://schemas.microsoft.com/office/drawing/2014/main" id="{801B5204-EEF4-474F-94DA-42D3E15DF0C9}"/>
+              </a:ext>
+            </a:extLst>
+          </p:cNvPr>
+          <p:cNvSpPr/>
+          <p:nvPr/>
+        </p:nvSpPr>
+        <p:spPr>
+          <a:xfrm>
+            <a:off x="10187571" y="2171420"/>
+            <a:ext cx="1307308" cy="716205"/>
+          </a:xfrm>
+          <a:prstGeom prst="downArrowCallout">
+            <a:avLst>
+              <a:gd name="adj1" fmla="val 18711"/>
+              <a:gd name="adj2" fmla="val 18711"/>
+              <a:gd name="adj3" fmla="val 25000"/>
+              <a:gd name="adj4" fmla="val 64977"/>
+            </a:avLst>
+          </a:prstGeom>
+          <a:solidFill>
+            <a:srgbClr val="FEB080"/>
+          </a:solidFill>
+          <a:ln>
+            <a:noFill/>
+          </a:ln>
+        </p:spPr>
+        <p:style>
+          <a:lnRef idx="2">
+            <a:schemeClr val="accent1">
+              <a:shade val="50000"/>
+            </a:schemeClr>
+          </a:lnRef>
+          <a:fillRef idx="1">
+            <a:schemeClr val="accent1"/>
+          </a:fillRef>
+          <a:effectRef idx="0">
+            <a:schemeClr val="accent1"/>
+          </a:effectRef>
+          <a:fontRef idx="minor">
+            <a:schemeClr val="lt1"/>
+          </a:fontRef>
+        </p:style>
+        <p:txBody>
+          <a:bodyPr rtlCol="0" anchor="ctr"/>
+          <a:lstStyle/>
+          <a:p>
+            <a:pPr algn="ctr"/>
+            <a:r>
+              <a:rPr lang="en-GB" sz="2400" dirty="0"/>
+              <a:t>feature</a:t>
+            </a:r>
+          </a:p>
+        </p:txBody>
+      </p:sp>
+      <p:sp>
+        <p:nvSpPr>
+          <p:cNvPr id="49" name="Down Arrow Callout 67">
+            <a:extLst>
+              <a:ext uri="{FF2B5EF4-FFF2-40B4-BE49-F238E27FC236}">
+                <a16:creationId xmlns:a16="http://schemas.microsoft.com/office/drawing/2014/main" id="{44335F7B-1B6E-46F4-8B46-F08B110215A6}"/>
+              </a:ext>
+            </a:extLst>
+          </p:cNvPr>
+          <p:cNvSpPr/>
+          <p:nvPr/>
+        </p:nvSpPr>
+        <p:spPr>
+          <a:xfrm>
+            <a:off x="8728136" y="3572320"/>
+            <a:ext cx="1307308" cy="716205"/>
+          </a:xfrm>
+          <a:prstGeom prst="upArrowCallout">
+            <a:avLst>
+              <a:gd name="adj1" fmla="val 15116"/>
+              <a:gd name="adj2" fmla="val 18410"/>
+              <a:gd name="adj3" fmla="val 25000"/>
+              <a:gd name="adj4" fmla="val 64977"/>
+            </a:avLst>
+          </a:prstGeom>
+          <a:solidFill>
+            <a:srgbClr val="FEB080"/>
+          </a:solidFill>
+          <a:ln>
+            <a:noFill/>
+          </a:ln>
+        </p:spPr>
+        <p:style>
+          <a:lnRef idx="2">
+            <a:schemeClr val="accent1">
+              <a:shade val="50000"/>
+            </a:schemeClr>
+          </a:lnRef>
+          <a:fillRef idx="1">
+            <a:schemeClr val="accent1"/>
+          </a:fillRef>
+          <a:effectRef idx="0">
+            <a:schemeClr val="accent1"/>
+          </a:effectRef>
+          <a:fontRef idx="minor">
+            <a:schemeClr val="lt1"/>
+          </a:fontRef>
+        </p:style>
+        <p:txBody>
+          <a:bodyPr rtlCol="0" anchor="ctr"/>
+          <a:lstStyle/>
+          <a:p>
+            <a:pPr algn="ctr"/>
+            <a:r>
+              <a:rPr lang="en-GB" sz="2400" dirty="0"/>
+              <a:t>master</a:t>
+            </a:r>
+          </a:p>
+        </p:txBody>
+      </p:sp>
+      <p:cxnSp>
+        <p:nvCxnSpPr>
+          <p:cNvPr id="50" name="Straight Arrow Connector 51">
+            <a:extLst>
+              <a:ext uri="{FF2B5EF4-FFF2-40B4-BE49-F238E27FC236}">
+                <a16:creationId xmlns:a16="http://schemas.microsoft.com/office/drawing/2014/main" id="{BD81CB17-9B1B-4DA1-88CA-1CD4411B8E63}"/>
+              </a:ext>
+            </a:extLst>
+          </p:cNvPr>
+          <p:cNvCxnSpPr/>
+          <p:nvPr/>
+        </p:nvCxnSpPr>
+        <p:spPr>
+          <a:xfrm flipV="1">
+            <a:off x="9724138" y="3229973"/>
+            <a:ext cx="774741" cy="1"/>
+          </a:xfrm>
+          <a:prstGeom prst="straightConnector1">
+            <a:avLst/>
+          </a:prstGeom>
+          <a:ln w="88900">
+            <a:tailEnd type="triangle"/>
+          </a:ln>
+        </p:spPr>
+        <p:style>
+          <a:lnRef idx="1">
+            <a:schemeClr val="accent1"/>
+          </a:lnRef>
+          <a:fillRef idx="0">
+            <a:schemeClr val="accent1"/>
+          </a:fillRef>
+          <a:effectRef idx="0">
+            <a:schemeClr val="accent1"/>
+          </a:effectRef>
+          <a:fontRef idx="minor">
+            <a:schemeClr val="tx1"/>
+          </a:fontRef>
+        </p:style>
+      </p:cxnSp>
+      <p:sp>
+        <p:nvSpPr>
+          <p:cNvPr id="51" name="Oval 52">
+            <a:extLst>
+              <a:ext uri="{FF2B5EF4-FFF2-40B4-BE49-F238E27FC236}">
+                <a16:creationId xmlns:a16="http://schemas.microsoft.com/office/drawing/2014/main" id="{35A7E165-9EEF-4BAA-B236-878B7617D2ED}"/>
+              </a:ext>
+            </a:extLst>
+          </p:cNvPr>
+          <p:cNvSpPr/>
+          <p:nvPr/>
+        </p:nvSpPr>
+        <p:spPr>
+          <a:xfrm>
+            <a:off x="10498878" y="2887625"/>
+            <a:ext cx="684695" cy="684695"/>
+          </a:xfrm>
+          <a:prstGeom prst="ellipse">
+            <a:avLst/>
+          </a:prstGeom>
+          <a:solidFill>
+            <a:srgbClr val="FF820A"/>
+          </a:solidFill>
+          <a:ln>
+            <a:noFill/>
+          </a:ln>
+        </p:spPr>
+        <p:style>
+          <a:lnRef idx="2">
+            <a:schemeClr val="accent1">
+              <a:shade val="50000"/>
+            </a:schemeClr>
+          </a:lnRef>
+          <a:fillRef idx="1">
+            <a:schemeClr val="accent1"/>
+          </a:fillRef>
+          <a:effectRef idx="0">
+            <a:schemeClr val="accent1"/>
+          </a:effectRef>
+          <a:fontRef idx="minor">
+            <a:schemeClr val="lt1"/>
+          </a:fontRef>
+        </p:style>
+        <p:txBody>
+          <a:bodyPr wrap="none" lIns="0" tIns="0" rIns="0" bIns="0" rtlCol="0" anchor="ctr"/>
+          <a:lstStyle/>
+          <a:p>
+            <a:pPr algn="ctr"/>
+            <a:r>
+              <a:rPr lang="en-GB" sz="3600" dirty="0"/>
+              <a:t>D’</a:t>
+            </a:r>
+          </a:p>
+        </p:txBody>
+      </p:sp>
+      <p:sp>
+        <p:nvSpPr>
+          <p:cNvPr id="55" name="Oval 47">
+            <a:extLst>
+              <a:ext uri="{FF2B5EF4-FFF2-40B4-BE49-F238E27FC236}">
+                <a16:creationId xmlns:a16="http://schemas.microsoft.com/office/drawing/2014/main" id="{89303513-9752-41F4-8E15-1868F9126CC8}"/>
+              </a:ext>
+            </a:extLst>
+          </p:cNvPr>
+          <p:cNvSpPr/>
+          <p:nvPr/>
+        </p:nvSpPr>
+        <p:spPr>
+          <a:xfrm>
+            <a:off x="7047440" y="6632403"/>
+            <a:ext cx="684695" cy="684695"/>
+          </a:xfrm>
+          <a:prstGeom prst="ellipse">
+            <a:avLst/>
+          </a:prstGeom>
+          <a:solidFill>
+            <a:srgbClr val="FF820A"/>
+          </a:solidFill>
+          <a:ln>
+            <a:noFill/>
+          </a:ln>
+        </p:spPr>
+        <p:style>
+          <a:lnRef idx="2">
+            <a:schemeClr val="accent1">
+              <a:shade val="50000"/>
+            </a:schemeClr>
+          </a:lnRef>
+          <a:fillRef idx="1">
+            <a:schemeClr val="accent1"/>
+          </a:fillRef>
+          <a:effectRef idx="0">
+            <a:schemeClr val="accent1"/>
+          </a:effectRef>
+          <a:fontRef idx="minor">
+            <a:schemeClr val="lt1"/>
+          </a:fontRef>
+        </p:style>
+        <p:txBody>
+          <a:bodyPr wrap="none" lIns="0" tIns="0" rIns="0" bIns="0" rtlCol="0" anchor="ctr"/>
+          <a:lstStyle/>
+          <a:p>
+            <a:pPr algn="ctr"/>
+            <a:r>
+              <a:rPr lang="en-GB" sz="3600" dirty="0"/>
+              <a:t>A</a:t>
+            </a:r>
+          </a:p>
+        </p:txBody>
+      </p:sp>
+      <p:sp>
+        <p:nvSpPr>
+          <p:cNvPr id="56" name="Oval 48">
+            <a:extLst>
+              <a:ext uri="{FF2B5EF4-FFF2-40B4-BE49-F238E27FC236}">
+                <a16:creationId xmlns:a16="http://schemas.microsoft.com/office/drawing/2014/main" id="{E181BD28-D195-4788-9C14-02EEB93506E1}"/>
+              </a:ext>
+            </a:extLst>
+          </p:cNvPr>
+          <p:cNvSpPr/>
+          <p:nvPr/>
+        </p:nvSpPr>
+        <p:spPr>
+          <a:xfrm>
+            <a:off x="8506876" y="6632403"/>
+            <a:ext cx="684695" cy="684695"/>
+          </a:xfrm>
+          <a:prstGeom prst="ellipse">
+            <a:avLst/>
+          </a:prstGeom>
+          <a:solidFill>
+            <a:srgbClr val="FF820A"/>
+          </a:solidFill>
+          <a:ln>
+            <a:noFill/>
+          </a:ln>
+        </p:spPr>
+        <p:style>
+          <a:lnRef idx="2">
+            <a:schemeClr val="accent1">
+              <a:shade val="50000"/>
+            </a:schemeClr>
+          </a:lnRef>
+          <a:fillRef idx="1">
+            <a:schemeClr val="accent1"/>
+          </a:fillRef>
+          <a:effectRef idx="0">
+            <a:schemeClr val="accent1"/>
+          </a:effectRef>
+          <a:fontRef idx="minor">
+            <a:schemeClr val="lt1"/>
+          </a:fontRef>
+        </p:style>
+        <p:txBody>
+          <a:bodyPr wrap="none" lIns="0" tIns="0" rIns="0" bIns="0" rtlCol="0" anchor="ctr"/>
+          <a:lstStyle/>
+          <a:p>
+            <a:pPr algn="ctr"/>
+            <a:r>
+              <a:rPr lang="en-GB" sz="3600" dirty="0"/>
+              <a:t>B</a:t>
+            </a:r>
+          </a:p>
+        </p:txBody>
+      </p:sp>
+      <p:sp>
+        <p:nvSpPr>
+          <p:cNvPr id="57" name="Oval 49">
+            <a:extLst>
+              <a:ext uri="{FF2B5EF4-FFF2-40B4-BE49-F238E27FC236}">
+                <a16:creationId xmlns:a16="http://schemas.microsoft.com/office/drawing/2014/main" id="{41CCF9C3-89E0-4C7D-B03D-5E3F10E09334}"/>
+              </a:ext>
+            </a:extLst>
+          </p:cNvPr>
+          <p:cNvSpPr/>
+          <p:nvPr/>
+        </p:nvSpPr>
+        <p:spPr>
+          <a:xfrm>
+            <a:off x="9966312" y="6632402"/>
+            <a:ext cx="684695" cy="684695"/>
+          </a:xfrm>
+          <a:prstGeom prst="ellipse">
+            <a:avLst/>
+          </a:prstGeom>
+          <a:solidFill>
+            <a:srgbClr val="FF820A"/>
+          </a:solidFill>
+          <a:ln>
+            <a:noFill/>
+          </a:ln>
+        </p:spPr>
+        <p:style>
+          <a:lnRef idx="2">
+            <a:schemeClr val="accent1">
+              <a:shade val="50000"/>
+            </a:schemeClr>
+          </a:lnRef>
+          <a:fillRef idx="1">
+            <a:schemeClr val="accent1"/>
+          </a:fillRef>
+          <a:effectRef idx="0">
+            <a:schemeClr val="accent1"/>
+          </a:effectRef>
+          <a:fontRef idx="minor">
+            <a:schemeClr val="lt1"/>
+          </a:fontRef>
+        </p:style>
+        <p:txBody>
+          <a:bodyPr wrap="none" lIns="0" tIns="0" rIns="0" bIns="0" rtlCol="0" anchor="ctr"/>
+          <a:lstStyle/>
+          <a:p>
+            <a:pPr algn="ctr"/>
+            <a:r>
+              <a:rPr lang="en-GB" sz="3600" dirty="0"/>
+              <a:t>C</a:t>
+            </a:r>
+          </a:p>
+        </p:txBody>
+      </p:sp>
+      <p:cxnSp>
+        <p:nvCxnSpPr>
+          <p:cNvPr id="58" name="Straight Arrow Connector 50">
+            <a:extLst>
+              <a:ext uri="{FF2B5EF4-FFF2-40B4-BE49-F238E27FC236}">
+                <a16:creationId xmlns:a16="http://schemas.microsoft.com/office/drawing/2014/main" id="{BD85B88A-06FA-4CEA-BEC0-DC460C94FD33}"/>
+              </a:ext>
+            </a:extLst>
+          </p:cNvPr>
+          <p:cNvCxnSpPr>
+            <a:stCxn id="55" idx="6"/>
+            <a:endCxn id="56" idx="2"/>
+          </p:cNvCxnSpPr>
+          <p:nvPr/>
+        </p:nvCxnSpPr>
+        <p:spPr>
+          <a:xfrm>
+            <a:off x="7732135" y="6974751"/>
+            <a:ext cx="774741" cy="0"/>
+          </a:xfrm>
+          <a:prstGeom prst="straightConnector1">
+            <a:avLst/>
+          </a:prstGeom>
+          <a:ln w="88900">
+            <a:tailEnd type="triangle"/>
+          </a:ln>
+        </p:spPr>
+        <p:style>
+          <a:lnRef idx="1">
+            <a:schemeClr val="accent1"/>
+          </a:lnRef>
+          <a:fillRef idx="0">
+            <a:schemeClr val="accent1"/>
+          </a:fillRef>
+          <a:effectRef idx="0">
+            <a:schemeClr val="accent1"/>
+          </a:effectRef>
+          <a:fontRef idx="minor">
+            <a:schemeClr val="tx1"/>
+          </a:fontRef>
+        </p:style>
+      </p:cxnSp>
+      <p:cxnSp>
+        <p:nvCxnSpPr>
+          <p:cNvPr id="59" name="Straight Arrow Connector 51">
+            <a:extLst>
+              <a:ext uri="{FF2B5EF4-FFF2-40B4-BE49-F238E27FC236}">
+                <a16:creationId xmlns:a16="http://schemas.microsoft.com/office/drawing/2014/main" id="{771C11A2-8703-47F9-866B-7F97F9792259}"/>
+              </a:ext>
+            </a:extLst>
+          </p:cNvPr>
+          <p:cNvCxnSpPr>
+            <a:stCxn id="56" idx="6"/>
+            <a:endCxn id="57" idx="2"/>
+          </p:cNvCxnSpPr>
+          <p:nvPr/>
+        </p:nvCxnSpPr>
+        <p:spPr>
+          <a:xfrm flipV="1">
+            <a:off x="9191571" y="6974750"/>
+            <a:ext cx="774741" cy="1"/>
+          </a:xfrm>
+          <a:prstGeom prst="straightConnector1">
+            <a:avLst/>
+          </a:prstGeom>
+          <a:ln w="88900">
+            <a:tailEnd type="triangle"/>
+          </a:ln>
+        </p:spPr>
+        <p:style>
+          <a:lnRef idx="1">
+            <a:schemeClr val="accent1"/>
+          </a:lnRef>
+          <a:fillRef idx="0">
+            <a:schemeClr val="accent1"/>
+          </a:fillRef>
+          <a:effectRef idx="0">
+            <a:schemeClr val="accent1"/>
+          </a:effectRef>
+          <a:fontRef idx="minor">
+            <a:schemeClr val="tx1"/>
+          </a:fontRef>
+        </p:style>
+      </p:cxnSp>
+      <p:sp>
+        <p:nvSpPr>
+          <p:cNvPr id="60" name="Oval 52">
+            <a:extLst>
+              <a:ext uri="{FF2B5EF4-FFF2-40B4-BE49-F238E27FC236}">
+                <a16:creationId xmlns:a16="http://schemas.microsoft.com/office/drawing/2014/main" id="{8C48BBA0-7CF0-49EE-AB94-ED148074B403}"/>
+              </a:ext>
+            </a:extLst>
+          </p:cNvPr>
+          <p:cNvSpPr/>
+          <p:nvPr/>
+        </p:nvSpPr>
+        <p:spPr>
+          <a:xfrm>
+            <a:off x="9966312" y="5500282"/>
+            <a:ext cx="684695" cy="684695"/>
+          </a:xfrm>
+          <a:prstGeom prst="ellipse">
+            <a:avLst/>
+          </a:prstGeom>
+          <a:solidFill>
+            <a:srgbClr val="FF820A"/>
+          </a:solidFill>
+          <a:ln>
+            <a:noFill/>
+          </a:ln>
+        </p:spPr>
+        <p:style>
+          <a:lnRef idx="2">
+            <a:schemeClr val="accent1">
+              <a:shade val="50000"/>
+            </a:schemeClr>
+          </a:lnRef>
+          <a:fillRef idx="1">
+            <a:schemeClr val="accent1"/>
+          </a:fillRef>
+          <a:effectRef idx="0">
+            <a:schemeClr val="accent1"/>
+          </a:effectRef>
+          <a:fontRef idx="minor">
+            <a:schemeClr val="lt1"/>
+          </a:fontRef>
+        </p:style>
+        <p:txBody>
+          <a:bodyPr wrap="none" lIns="0" tIns="0" rIns="0" bIns="0" rtlCol="0" anchor="ctr"/>
+          <a:lstStyle/>
+          <a:p>
+            <a:pPr algn="ctr"/>
+            <a:r>
+              <a:rPr lang="en-GB" sz="3600" dirty="0"/>
+              <a:t>D</a:t>
+            </a:r>
+          </a:p>
+        </p:txBody>
+      </p:sp>
+      <p:cxnSp>
+        <p:nvCxnSpPr>
+          <p:cNvPr id="61" name="Curved Connector 53">
+            <a:extLst>
+              <a:ext uri="{FF2B5EF4-FFF2-40B4-BE49-F238E27FC236}">
+                <a16:creationId xmlns:a16="http://schemas.microsoft.com/office/drawing/2014/main" id="{6382AC83-498E-45FE-90BE-081D2A0F1647}"/>
+              </a:ext>
+            </a:extLst>
+          </p:cNvPr>
+          <p:cNvCxnSpPr>
+            <a:stCxn id="56" idx="0"/>
+            <a:endCxn id="60" idx="2"/>
+          </p:cNvCxnSpPr>
+          <p:nvPr/>
+        </p:nvCxnSpPr>
+        <p:spPr>
+          <a:xfrm rot="5400000" flipH="1" flipV="1">
+            <a:off x="9012882" y="5678973"/>
+            <a:ext cx="789773" cy="1117088"/>
+          </a:xfrm>
+          <a:prstGeom prst="curvedConnector2">
+            <a:avLst/>
+          </a:prstGeom>
+          <a:ln w="88900">
+            <a:tailEnd type="triangle"/>
+          </a:ln>
+        </p:spPr>
+        <p:style>
+          <a:lnRef idx="1">
+            <a:schemeClr val="accent1"/>
+          </a:lnRef>
+          <a:fillRef idx="0">
+            <a:schemeClr val="accent1"/>
+          </a:fillRef>
+          <a:effectRef idx="0">
+            <a:schemeClr val="accent1"/>
+          </a:effectRef>
+          <a:fontRef idx="minor">
+            <a:schemeClr val="tx1"/>
+          </a:fontRef>
+        </p:style>
+      </p:cxnSp>
+      <p:sp>
+        <p:nvSpPr>
+          <p:cNvPr id="62" name="Oval 49">
+            <a:extLst>
+              <a:ext uri="{FF2B5EF4-FFF2-40B4-BE49-F238E27FC236}">
+                <a16:creationId xmlns:a16="http://schemas.microsoft.com/office/drawing/2014/main" id="{B29F7565-FEB5-4CEC-9255-2638F54A09DB}"/>
+              </a:ext>
+            </a:extLst>
+          </p:cNvPr>
+          <p:cNvSpPr/>
+          <p:nvPr/>
+        </p:nvSpPr>
+        <p:spPr>
+          <a:xfrm>
+            <a:off x="11425748" y="5496237"/>
+            <a:ext cx="684695" cy="684695"/>
+          </a:xfrm>
+          <a:prstGeom prst="ellipse">
+            <a:avLst/>
+          </a:prstGeom>
+          <a:solidFill>
+            <a:srgbClr val="FF820A"/>
+          </a:solidFill>
+          <a:ln>
+            <a:noFill/>
+          </a:ln>
+        </p:spPr>
+        <p:style>
+          <a:lnRef idx="2">
+            <a:schemeClr val="accent1">
+              <a:shade val="50000"/>
+            </a:schemeClr>
+          </a:lnRef>
+          <a:fillRef idx="1">
+            <a:schemeClr val="accent1"/>
+          </a:fillRef>
+          <a:effectRef idx="0">
+            <a:schemeClr val="accent1"/>
+          </a:effectRef>
+          <a:fontRef idx="minor">
+            <a:schemeClr val="lt1"/>
+          </a:fontRef>
+        </p:style>
+        <p:txBody>
+          <a:bodyPr wrap="none" lIns="0" tIns="0" rIns="0" bIns="0" rtlCol="0" anchor="ctr"/>
+          <a:lstStyle/>
+          <a:p>
+            <a:pPr algn="ctr"/>
+            <a:r>
+              <a:rPr lang="en-GB" sz="3600" dirty="0"/>
+              <a:t>E</a:t>
+            </a:r>
+          </a:p>
+        </p:txBody>
+      </p:sp>
+      <p:cxnSp>
+        <p:nvCxnSpPr>
+          <p:cNvPr id="63" name="Straight Arrow Connector 51">
+            <a:extLst>
+              <a:ext uri="{FF2B5EF4-FFF2-40B4-BE49-F238E27FC236}">
+                <a16:creationId xmlns:a16="http://schemas.microsoft.com/office/drawing/2014/main" id="{7F09BCE1-7B2E-40A1-B9D7-9E0A32225A02}"/>
+              </a:ext>
+            </a:extLst>
+          </p:cNvPr>
+          <p:cNvCxnSpPr/>
+          <p:nvPr/>
+        </p:nvCxnSpPr>
+        <p:spPr>
+          <a:xfrm flipV="1">
+            <a:off x="10651007" y="5838585"/>
+            <a:ext cx="774741" cy="1"/>
+          </a:xfrm>
+          <a:prstGeom prst="straightConnector1">
+            <a:avLst/>
+          </a:prstGeom>
+          <a:ln w="88900">
+            <a:tailEnd type="triangle"/>
+          </a:ln>
+        </p:spPr>
+        <p:style>
+          <a:lnRef idx="1">
+            <a:schemeClr val="accent1"/>
+          </a:lnRef>
+          <a:fillRef idx="0">
+            <a:schemeClr val="accent1"/>
+          </a:fillRef>
+          <a:effectRef idx="0">
+            <a:schemeClr val="accent1"/>
+          </a:effectRef>
+          <a:fontRef idx="minor">
+            <a:schemeClr val="tx1"/>
+          </a:fontRef>
+        </p:style>
+      </p:cxnSp>
+      <p:cxnSp>
+        <p:nvCxnSpPr>
+          <p:cNvPr id="64" name="Curved Connector 53">
+            <a:extLst>
+              <a:ext uri="{FF2B5EF4-FFF2-40B4-BE49-F238E27FC236}">
+                <a16:creationId xmlns:a16="http://schemas.microsoft.com/office/drawing/2014/main" id="{67379437-430C-4280-A256-80FEBB60BDEC}"/>
+              </a:ext>
+            </a:extLst>
+          </p:cNvPr>
+          <p:cNvCxnSpPr>
+            <a:cxnSpLocks/>
+            <a:stCxn id="57" idx="6"/>
+            <a:endCxn id="62" idx="4"/>
+          </p:cNvCxnSpPr>
+          <p:nvPr/>
+        </p:nvCxnSpPr>
+        <p:spPr>
+          <a:xfrm flipV="1">
+            <a:off x="10651007" y="6180932"/>
+            <a:ext cx="1117089" cy="793818"/>
+          </a:xfrm>
+          <a:prstGeom prst="curvedConnector2">
+            <a:avLst/>
+          </a:prstGeom>
+          <a:ln w="88900">
+            <a:tailEnd type="triangle"/>
+          </a:ln>
+        </p:spPr>
+        <p:style>
+          <a:lnRef idx="1">
+            <a:schemeClr val="accent1"/>
+          </a:lnRef>
+          <a:fillRef idx="0">
+            <a:schemeClr val="accent1"/>
+          </a:fillRef>
+          <a:effectRef idx="0">
+            <a:schemeClr val="accent1"/>
+          </a:effectRef>
+          <a:fontRef idx="minor">
+            <a:schemeClr val="tx1"/>
+          </a:fontRef>
+        </p:style>
+      </p:cxnSp>
+      <p:sp>
+        <p:nvSpPr>
+          <p:cNvPr id="66" name="Down Arrow Callout 67">
+            <a:extLst>
+              <a:ext uri="{FF2B5EF4-FFF2-40B4-BE49-F238E27FC236}">
+                <a16:creationId xmlns:a16="http://schemas.microsoft.com/office/drawing/2014/main" id="{796D3411-EAD2-46D0-AA39-254A758A5DE0}"/>
+              </a:ext>
+            </a:extLst>
+          </p:cNvPr>
+          <p:cNvSpPr/>
+          <p:nvPr/>
+        </p:nvSpPr>
+        <p:spPr>
+          <a:xfrm>
+            <a:off x="12567134" y="7301342"/>
+            <a:ext cx="1307308" cy="716205"/>
+          </a:xfrm>
+          <a:prstGeom prst="upArrowCallout">
+            <a:avLst>
+              <a:gd name="adj1" fmla="val 15116"/>
+              <a:gd name="adj2" fmla="val 18410"/>
+              <a:gd name="adj3" fmla="val 25000"/>
+              <a:gd name="adj4" fmla="val 64977"/>
+            </a:avLst>
+          </a:prstGeom>
+          <a:solidFill>
+            <a:srgbClr val="FEB080"/>
+          </a:solidFill>
+          <a:ln>
+            <a:noFill/>
+          </a:ln>
+        </p:spPr>
+        <p:style>
+          <a:lnRef idx="2">
+            <a:schemeClr val="accent1">
+              <a:shade val="50000"/>
+            </a:schemeClr>
+          </a:lnRef>
+          <a:fillRef idx="1">
+            <a:schemeClr val="accent1"/>
+          </a:fillRef>
+          <a:effectRef idx="0">
+            <a:schemeClr val="accent1"/>
+          </a:effectRef>
+          <a:fontRef idx="minor">
+            <a:schemeClr val="lt1"/>
+          </a:fontRef>
+        </p:style>
+        <p:txBody>
+          <a:bodyPr rtlCol="0" anchor="ctr"/>
+          <a:lstStyle/>
+          <a:p>
+            <a:pPr algn="ctr"/>
+            <a:r>
+              <a:rPr lang="en-GB" sz="2400" dirty="0"/>
+              <a:t>master</a:t>
+            </a:r>
+          </a:p>
+        </p:txBody>
+      </p:sp>
+      <p:cxnSp>
+        <p:nvCxnSpPr>
+          <p:cNvPr id="71" name="Straight Arrow Connector 51">
+            <a:extLst>
+              <a:ext uri="{FF2B5EF4-FFF2-40B4-BE49-F238E27FC236}">
+                <a16:creationId xmlns:a16="http://schemas.microsoft.com/office/drawing/2014/main" id="{573254AA-6A26-4258-A56B-2A46FC678765}"/>
+              </a:ext>
+            </a:extLst>
+          </p:cNvPr>
+          <p:cNvCxnSpPr>
+            <a:cxnSpLocks/>
+            <a:endCxn id="73" idx="2"/>
+          </p:cNvCxnSpPr>
+          <p:nvPr/>
+        </p:nvCxnSpPr>
+        <p:spPr>
+          <a:xfrm flipV="1">
+            <a:off x="10651006" y="6974750"/>
+            <a:ext cx="2227435" cy="2"/>
+          </a:xfrm>
+          <a:prstGeom prst="straightConnector1">
+            <a:avLst/>
+          </a:prstGeom>
+          <a:ln w="88900">
+            <a:tailEnd type="triangle"/>
+          </a:ln>
+        </p:spPr>
+        <p:style>
+          <a:lnRef idx="1">
+            <a:schemeClr val="accent1"/>
+          </a:lnRef>
+          <a:fillRef idx="0">
+            <a:schemeClr val="accent1"/>
+          </a:fillRef>
+          <a:effectRef idx="0">
+            <a:schemeClr val="accent1"/>
+          </a:effectRef>
+          <a:fontRef idx="minor">
+            <a:schemeClr val="tx1"/>
+          </a:fontRef>
+        </p:style>
+      </p:cxnSp>
+      <p:sp>
+        <p:nvSpPr>
+          <p:cNvPr id="73" name="Oval 49">
+            <a:extLst>
+              <a:ext uri="{FF2B5EF4-FFF2-40B4-BE49-F238E27FC236}">
+                <a16:creationId xmlns:a16="http://schemas.microsoft.com/office/drawing/2014/main" id="{29378446-7A8B-4D61-935A-76E502C4D104}"/>
+              </a:ext>
+            </a:extLst>
+          </p:cNvPr>
+          <p:cNvSpPr/>
+          <p:nvPr/>
+        </p:nvSpPr>
+        <p:spPr>
+          <a:xfrm>
+            <a:off x="12878441" y="6632402"/>
+            <a:ext cx="684695" cy="684695"/>
+          </a:xfrm>
+          <a:prstGeom prst="ellipse">
+            <a:avLst/>
+          </a:prstGeom>
+          <a:solidFill>
+            <a:srgbClr val="FF820A"/>
+          </a:solidFill>
+          <a:ln>
+            <a:noFill/>
+          </a:ln>
+        </p:spPr>
+        <p:style>
+          <a:lnRef idx="2">
+            <a:schemeClr val="accent1">
+              <a:shade val="50000"/>
+            </a:schemeClr>
+          </a:lnRef>
+          <a:fillRef idx="1">
+            <a:schemeClr val="accent1"/>
+          </a:fillRef>
+          <a:effectRef idx="0">
+            <a:schemeClr val="accent1"/>
+          </a:effectRef>
+          <a:fontRef idx="minor">
+            <a:schemeClr val="lt1"/>
+          </a:fontRef>
+        </p:style>
+        <p:txBody>
+          <a:bodyPr wrap="none" lIns="0" tIns="0" rIns="0" bIns="0" rtlCol="0" anchor="ctr"/>
+          <a:lstStyle/>
+          <a:p>
+            <a:pPr algn="ctr"/>
+            <a:r>
+              <a:rPr lang="en-GB" sz="3600" dirty="0"/>
+              <a:t>F</a:t>
+            </a:r>
+          </a:p>
+        </p:txBody>
+      </p:sp>
+      <p:cxnSp>
+        <p:nvCxnSpPr>
+          <p:cNvPr id="75" name="Curved Connector 53">
+            <a:extLst>
+              <a:ext uri="{FF2B5EF4-FFF2-40B4-BE49-F238E27FC236}">
+                <a16:creationId xmlns:a16="http://schemas.microsoft.com/office/drawing/2014/main" id="{25F5BBDF-0953-4C46-83A4-997861AD1E67}"/>
+              </a:ext>
+            </a:extLst>
+          </p:cNvPr>
+          <p:cNvCxnSpPr>
+            <a:cxnSpLocks/>
+            <a:stCxn id="62" idx="6"/>
+            <a:endCxn id="73" idx="0"/>
+          </p:cNvCxnSpPr>
+          <p:nvPr/>
+        </p:nvCxnSpPr>
+        <p:spPr>
+          <a:xfrm>
+            <a:off x="12110443" y="5838585"/>
+            <a:ext cx="1110346" cy="793817"/>
+          </a:xfrm>
+          <a:prstGeom prst="curvedConnector2">
+            <a:avLst/>
+          </a:prstGeom>
+          <a:ln w="88900">
+            <a:tailEnd type="triangle"/>
+          </a:ln>
+        </p:spPr>
+        <p:style>
+          <a:lnRef idx="1">
+            <a:schemeClr val="accent1"/>
+          </a:lnRef>
+          <a:fillRef idx="0">
+            <a:schemeClr val="accent1"/>
+          </a:fillRef>
+          <a:effectRef idx="0">
+            <a:schemeClr val="accent1"/>
+          </a:effectRef>
+          <a:fontRef idx="minor">
+            <a:schemeClr val="tx1"/>
+          </a:fontRef>
+        </p:style>
+      </p:cxnSp>
+      <p:sp>
+        <p:nvSpPr>
+          <p:cNvPr id="79" name="Down Arrow Callout 67">
+            <a:extLst>
+              <a:ext uri="{FF2B5EF4-FFF2-40B4-BE49-F238E27FC236}">
+                <a16:creationId xmlns:a16="http://schemas.microsoft.com/office/drawing/2014/main" id="{476EB1E6-7470-49F2-86B6-CA83CD8EBC51}"/>
+              </a:ext>
+            </a:extLst>
+          </p:cNvPr>
+          <p:cNvSpPr/>
+          <p:nvPr/>
+        </p:nvSpPr>
+        <p:spPr>
+          <a:xfrm>
+            <a:off x="8754114" y="1039300"/>
+            <a:ext cx="1307308" cy="716205"/>
+          </a:xfrm>
+          <a:prstGeom prst="downArrowCallout">
+            <a:avLst>
+              <a:gd name="adj1" fmla="val 18711"/>
+              <a:gd name="adj2" fmla="val 18711"/>
+              <a:gd name="adj3" fmla="val 25000"/>
+              <a:gd name="adj4" fmla="val 64977"/>
+            </a:avLst>
+          </a:prstGeom>
+          <a:solidFill>
+            <a:srgbClr val="FEB080">
+              <a:alpha val="0"/>
+            </a:srgbClr>
+          </a:solidFill>
+          <a:ln>
+            <a:noFill/>
+          </a:ln>
+        </p:spPr>
+        <p:style>
+          <a:lnRef idx="2">
+            <a:schemeClr val="accent1">
+              <a:shade val="50000"/>
+            </a:schemeClr>
+          </a:lnRef>
+          <a:fillRef idx="1">
+            <a:schemeClr val="accent1"/>
+          </a:fillRef>
+          <a:effectRef idx="0">
+            <a:schemeClr val="accent1"/>
+          </a:effectRef>
+          <a:fontRef idx="minor">
+            <a:schemeClr val="lt1"/>
+          </a:fontRef>
+        </p:style>
+        <p:txBody>
+          <a:bodyPr rtlCol="0" anchor="ctr"/>
+          <a:lstStyle/>
+          <a:p>
+            <a:pPr algn="ctr"/>
+            <a:endParaRPr lang="en-GB" sz="2400" dirty="0"/>
           </a:p>
         </p:txBody>
       </p:sp>

</xml_diff>

<commit_message>
added forking workflow slide
</commit_message>
<xml_diff>
--- a/graph_diagrams.pptx
+++ b/graph_diagrams.pptx
@@ -15,6 +15,7 @@
     <p:sldId id="261" r:id="rId9"/>
     <p:sldId id="264" r:id="rId10"/>
     <p:sldId id="265" r:id="rId11"/>
+    <p:sldId id="266" r:id="rId12"/>
   </p:sldIdLst>
   <p:sldSz cx="12192000" cy="6858000"/>
   <p:notesSz cx="6858000" cy="9144000"/>
@@ -6994,6 +6995,1579 @@
     <p:extLst>
       <p:ext uri="{BB962C8B-B14F-4D97-AF65-F5344CB8AC3E}">
         <p14:creationId xmlns:p14="http://schemas.microsoft.com/office/powerpoint/2010/main" val="3100751570"/>
+      </p:ext>
+    </p:extLst>
+  </p:cSld>
+  <p:clrMapOvr>
+    <a:masterClrMapping/>
+  </p:clrMapOvr>
+</p:sld>
+</file>
+
+<file path=ppt/slides/slide11.xml><?xml version="1.0" encoding="utf-8"?>
+<p:sld xmlns:a="http://schemas.openxmlformats.org/drawingml/2006/main" xmlns:r="http://schemas.openxmlformats.org/officeDocument/2006/relationships" xmlns:p="http://schemas.openxmlformats.org/presentationml/2006/main">
+  <p:cSld>
+    <p:spTree>
+      <p:nvGrpSpPr>
+        <p:cNvPr id="1" name=""/>
+        <p:cNvGrpSpPr/>
+        <p:nvPr/>
+      </p:nvGrpSpPr>
+      <p:grpSpPr>
+        <a:xfrm>
+          <a:off x="0" y="0"/>
+          <a:ext cx="0" cy="0"/>
+          <a:chOff x="0" y="0"/>
+          <a:chExt cx="0" cy="0"/>
+        </a:xfrm>
+      </p:grpSpPr>
+      <p:cxnSp>
+        <p:nvCxnSpPr>
+          <p:cNvPr id="53" name="Gerade Verbindung mit Pfeil 52">
+            <a:extLst>
+              <a:ext uri="{FF2B5EF4-FFF2-40B4-BE49-F238E27FC236}">
+                <a16:creationId xmlns:a16="http://schemas.microsoft.com/office/drawing/2014/main" id="{A480F2B6-0606-40DA-9241-39FCE443BB95}"/>
+              </a:ext>
+            </a:extLst>
+          </p:cNvPr>
+          <p:cNvCxnSpPr>
+            <a:cxnSpLocks/>
+            <a:stCxn id="10" idx="4"/>
+            <a:endCxn id="19" idx="1"/>
+          </p:cNvCxnSpPr>
+          <p:nvPr/>
+        </p:nvCxnSpPr>
+        <p:spPr>
+          <a:xfrm>
+            <a:off x="4032885" y="2301557"/>
+            <a:ext cx="1384766" cy="658918"/>
+          </a:xfrm>
+          <a:prstGeom prst="straightConnector1">
+            <a:avLst/>
+          </a:prstGeom>
+          <a:ln w="44450">
+            <a:solidFill>
+              <a:schemeClr val="accent1">
+                <a:lumMod val="60000"/>
+                <a:lumOff val="40000"/>
+              </a:schemeClr>
+            </a:solidFill>
+            <a:tailEnd type="triangle"/>
+          </a:ln>
+        </p:spPr>
+        <p:style>
+          <a:lnRef idx="1">
+            <a:schemeClr val="accent1"/>
+          </a:lnRef>
+          <a:fillRef idx="0">
+            <a:schemeClr val="accent1"/>
+          </a:fillRef>
+          <a:effectRef idx="0">
+            <a:schemeClr val="accent1"/>
+          </a:effectRef>
+          <a:fontRef idx="minor">
+            <a:schemeClr val="tx1"/>
+          </a:fontRef>
+        </p:style>
+      </p:cxnSp>
+      <p:cxnSp>
+        <p:nvCxnSpPr>
+          <p:cNvPr id="56" name="Gerade Verbindung mit Pfeil 55">
+            <a:extLst>
+              <a:ext uri="{FF2B5EF4-FFF2-40B4-BE49-F238E27FC236}">
+                <a16:creationId xmlns:a16="http://schemas.microsoft.com/office/drawing/2014/main" id="{4C4B90AC-4C22-4161-A128-2C845ACAB6F6}"/>
+              </a:ext>
+            </a:extLst>
+          </p:cNvPr>
+          <p:cNvCxnSpPr>
+            <a:cxnSpLocks/>
+            <a:stCxn id="14" idx="2"/>
+            <a:endCxn id="19" idx="7"/>
+          </p:cNvCxnSpPr>
+          <p:nvPr/>
+        </p:nvCxnSpPr>
+        <p:spPr>
+          <a:xfrm flipH="1">
+            <a:off x="5665637" y="2301557"/>
+            <a:ext cx="1384768" cy="658918"/>
+          </a:xfrm>
+          <a:prstGeom prst="straightConnector1">
+            <a:avLst/>
+          </a:prstGeom>
+          <a:ln w="44450">
+            <a:solidFill>
+              <a:schemeClr val="accent6">
+                <a:lumMod val="60000"/>
+                <a:lumOff val="40000"/>
+              </a:schemeClr>
+            </a:solidFill>
+            <a:tailEnd type="triangle"/>
+          </a:ln>
+        </p:spPr>
+        <p:style>
+          <a:lnRef idx="1">
+            <a:schemeClr val="accent1"/>
+          </a:lnRef>
+          <a:fillRef idx="0">
+            <a:schemeClr val="accent1"/>
+          </a:fillRef>
+          <a:effectRef idx="0">
+            <a:schemeClr val="accent1"/>
+          </a:effectRef>
+          <a:fontRef idx="minor">
+            <a:schemeClr val="tx1"/>
+          </a:fontRef>
+        </p:style>
+      </p:cxnSp>
+      <p:cxnSp>
+        <p:nvCxnSpPr>
+          <p:cNvPr id="31" name="Gerade Verbindung mit Pfeil 30">
+            <a:extLst>
+              <a:ext uri="{FF2B5EF4-FFF2-40B4-BE49-F238E27FC236}">
+                <a16:creationId xmlns:a16="http://schemas.microsoft.com/office/drawing/2014/main" id="{804718AF-2681-4539-AC36-441A5F7B9576}"/>
+              </a:ext>
+            </a:extLst>
+          </p:cNvPr>
+          <p:cNvCxnSpPr>
+            <a:cxnSpLocks/>
+            <a:stCxn id="4" idx="3"/>
+            <a:endCxn id="26" idx="7"/>
+          </p:cNvCxnSpPr>
+          <p:nvPr/>
+        </p:nvCxnSpPr>
+        <p:spPr>
+          <a:xfrm flipH="1">
+            <a:off x="3674912" y="2189727"/>
+            <a:ext cx="1866733" cy="770748"/>
+          </a:xfrm>
+          <a:prstGeom prst="straightConnector1">
+            <a:avLst/>
+          </a:prstGeom>
+          <a:ln w="44450">
+            <a:solidFill>
+              <a:srgbClr val="7030A0"/>
+            </a:solidFill>
+            <a:tailEnd type="triangle"/>
+          </a:ln>
+        </p:spPr>
+        <p:style>
+          <a:lnRef idx="1">
+            <a:schemeClr val="accent1"/>
+          </a:lnRef>
+          <a:fillRef idx="0">
+            <a:schemeClr val="accent1"/>
+          </a:fillRef>
+          <a:effectRef idx="0">
+            <a:schemeClr val="accent1"/>
+          </a:effectRef>
+          <a:fontRef idx="minor">
+            <a:schemeClr val="tx1"/>
+          </a:fontRef>
+        </p:style>
+      </p:cxnSp>
+      <p:cxnSp>
+        <p:nvCxnSpPr>
+          <p:cNvPr id="33" name="Gerade Verbindung mit Pfeil 32">
+            <a:extLst>
+              <a:ext uri="{FF2B5EF4-FFF2-40B4-BE49-F238E27FC236}">
+                <a16:creationId xmlns:a16="http://schemas.microsoft.com/office/drawing/2014/main" id="{39733C93-17E8-45E4-B457-BA1C3A2597F2}"/>
+              </a:ext>
+            </a:extLst>
+          </p:cNvPr>
+          <p:cNvCxnSpPr>
+            <a:cxnSpLocks/>
+            <a:stCxn id="26" idx="0"/>
+            <a:endCxn id="10" idx="3"/>
+          </p:cNvCxnSpPr>
+          <p:nvPr/>
+        </p:nvCxnSpPr>
+        <p:spPr>
+          <a:xfrm flipV="1">
+            <a:off x="3550919" y="2504122"/>
+            <a:ext cx="1" cy="404994"/>
+          </a:xfrm>
+          <a:prstGeom prst="straightConnector1">
+            <a:avLst/>
+          </a:prstGeom>
+          <a:ln w="44450">
+            <a:solidFill>
+              <a:schemeClr val="accent1">
+                <a:lumMod val="60000"/>
+                <a:lumOff val="40000"/>
+              </a:schemeClr>
+            </a:solidFill>
+            <a:headEnd type="triangle"/>
+            <a:tailEnd type="triangle"/>
+          </a:ln>
+        </p:spPr>
+        <p:style>
+          <a:lnRef idx="1">
+            <a:schemeClr val="accent1"/>
+          </a:lnRef>
+          <a:fillRef idx="0">
+            <a:schemeClr val="accent1"/>
+          </a:fillRef>
+          <a:effectRef idx="0">
+            <a:schemeClr val="accent1"/>
+          </a:effectRef>
+          <a:fontRef idx="minor">
+            <a:schemeClr val="tx1"/>
+          </a:fontRef>
+        </p:style>
+      </p:cxnSp>
+      <p:cxnSp>
+        <p:nvCxnSpPr>
+          <p:cNvPr id="34" name="Gerade Verbindung mit Pfeil 33">
+            <a:extLst>
+              <a:ext uri="{FF2B5EF4-FFF2-40B4-BE49-F238E27FC236}">
+                <a16:creationId xmlns:a16="http://schemas.microsoft.com/office/drawing/2014/main" id="{E382C66C-8B78-49CA-92D9-62FACB07675B}"/>
+              </a:ext>
+            </a:extLst>
+          </p:cNvPr>
+          <p:cNvCxnSpPr>
+            <a:cxnSpLocks/>
+            <a:stCxn id="29" idx="0"/>
+            <a:endCxn id="14" idx="3"/>
+          </p:cNvCxnSpPr>
+          <p:nvPr/>
+        </p:nvCxnSpPr>
+        <p:spPr>
+          <a:xfrm flipV="1">
+            <a:off x="7532369" y="2504122"/>
+            <a:ext cx="1" cy="404994"/>
+          </a:xfrm>
+          <a:prstGeom prst="straightConnector1">
+            <a:avLst/>
+          </a:prstGeom>
+          <a:ln w="44450">
+            <a:solidFill>
+              <a:schemeClr val="accent6">
+                <a:lumMod val="60000"/>
+                <a:lumOff val="40000"/>
+              </a:schemeClr>
+            </a:solidFill>
+            <a:headEnd type="triangle"/>
+            <a:tailEnd type="triangle"/>
+          </a:ln>
+        </p:spPr>
+        <p:style>
+          <a:lnRef idx="1">
+            <a:schemeClr val="accent1"/>
+          </a:lnRef>
+          <a:fillRef idx="0">
+            <a:schemeClr val="accent1"/>
+          </a:fillRef>
+          <a:effectRef idx="0">
+            <a:schemeClr val="accent1"/>
+          </a:effectRef>
+          <a:fontRef idx="minor">
+            <a:schemeClr val="tx1"/>
+          </a:fontRef>
+        </p:style>
+      </p:cxnSp>
+      <p:cxnSp>
+        <p:nvCxnSpPr>
+          <p:cNvPr id="47" name="Gerade Verbindung mit Pfeil 46">
+            <a:extLst>
+              <a:ext uri="{FF2B5EF4-FFF2-40B4-BE49-F238E27FC236}">
+                <a16:creationId xmlns:a16="http://schemas.microsoft.com/office/drawing/2014/main" id="{34C1D555-E96F-4EC6-A111-FF297F2377C3}"/>
+              </a:ext>
+            </a:extLst>
+          </p:cNvPr>
+          <p:cNvCxnSpPr>
+            <a:cxnSpLocks/>
+            <a:stCxn id="4" idx="3"/>
+            <a:endCxn id="29" idx="1"/>
+          </p:cNvCxnSpPr>
+          <p:nvPr/>
+        </p:nvCxnSpPr>
+        <p:spPr>
+          <a:xfrm>
+            <a:off x="5541645" y="2189727"/>
+            <a:ext cx="1866731" cy="770748"/>
+          </a:xfrm>
+          <a:prstGeom prst="straightConnector1">
+            <a:avLst/>
+          </a:prstGeom>
+          <a:ln w="44450">
+            <a:solidFill>
+              <a:srgbClr val="7030A0"/>
+            </a:solidFill>
+            <a:tailEnd type="triangle"/>
+          </a:ln>
+        </p:spPr>
+        <p:style>
+          <a:lnRef idx="1">
+            <a:schemeClr val="accent1"/>
+          </a:lnRef>
+          <a:fillRef idx="0">
+            <a:schemeClr val="accent1"/>
+          </a:fillRef>
+          <a:effectRef idx="0">
+            <a:schemeClr val="accent1"/>
+          </a:effectRef>
+          <a:fontRef idx="minor">
+            <a:schemeClr val="tx1"/>
+          </a:fontRef>
+        </p:style>
+      </p:cxnSp>
+      <p:cxnSp>
+        <p:nvCxnSpPr>
+          <p:cNvPr id="50" name="Gerade Verbindung mit Pfeil 49">
+            <a:extLst>
+              <a:ext uri="{FF2B5EF4-FFF2-40B4-BE49-F238E27FC236}">
+                <a16:creationId xmlns:a16="http://schemas.microsoft.com/office/drawing/2014/main" id="{D229F99D-FF1F-45B7-A342-7BAF89B870AD}"/>
+              </a:ext>
+            </a:extLst>
+          </p:cNvPr>
+          <p:cNvCxnSpPr>
+            <a:cxnSpLocks/>
+            <a:stCxn id="19" idx="0"/>
+            <a:endCxn id="4" idx="3"/>
+          </p:cNvCxnSpPr>
+          <p:nvPr/>
+        </p:nvCxnSpPr>
+        <p:spPr>
+          <a:xfrm flipV="1">
+            <a:off x="5541644" y="2189727"/>
+            <a:ext cx="1" cy="719389"/>
+          </a:xfrm>
+          <a:prstGeom prst="straightConnector1">
+            <a:avLst/>
+          </a:prstGeom>
+          <a:ln w="44450">
+            <a:solidFill>
+              <a:srgbClr val="7030A0"/>
+            </a:solidFill>
+            <a:headEnd type="triangle"/>
+            <a:tailEnd type="triangle"/>
+          </a:ln>
+        </p:spPr>
+        <p:style>
+          <a:lnRef idx="1">
+            <a:schemeClr val="accent1"/>
+          </a:lnRef>
+          <a:fillRef idx="0">
+            <a:schemeClr val="accent1"/>
+          </a:fillRef>
+          <a:effectRef idx="0">
+            <a:schemeClr val="accent1"/>
+          </a:effectRef>
+          <a:fontRef idx="minor">
+            <a:schemeClr val="tx1"/>
+          </a:fontRef>
+        </p:style>
+      </p:cxnSp>
+      <p:grpSp>
+        <p:nvGrpSpPr>
+          <p:cNvPr id="21" name="Gruppieren 20">
+            <a:extLst>
+              <a:ext uri="{FF2B5EF4-FFF2-40B4-BE49-F238E27FC236}">
+                <a16:creationId xmlns:a16="http://schemas.microsoft.com/office/drawing/2014/main" id="{8924F145-CC61-4067-82DA-107FE83AAC59}"/>
+              </a:ext>
+            </a:extLst>
+          </p:cNvPr>
+          <p:cNvGrpSpPr/>
+          <p:nvPr/>
+        </p:nvGrpSpPr>
+        <p:grpSpPr>
+          <a:xfrm>
+            <a:off x="4930140" y="796521"/>
+            <a:ext cx="1223010" cy="1393206"/>
+            <a:chOff x="5059680" y="944087"/>
+            <a:chExt cx="963930" cy="1098073"/>
+          </a:xfrm>
+        </p:grpSpPr>
+        <p:sp>
+          <p:nvSpPr>
+            <p:cNvPr id="4" name="Zylinder 3">
+              <a:extLst>
+                <a:ext uri="{FF2B5EF4-FFF2-40B4-BE49-F238E27FC236}">
+                  <a16:creationId xmlns:a16="http://schemas.microsoft.com/office/drawing/2014/main" id="{5952976C-E2C6-43F9-9CF7-761F8AAB1A51}"/>
+                </a:ext>
+              </a:extLst>
+            </p:cNvPr>
+            <p:cNvSpPr/>
+            <p:nvPr/>
+          </p:nvSpPr>
+          <p:spPr>
+            <a:xfrm>
+              <a:off x="5059680" y="1637030"/>
+              <a:ext cx="963930" cy="405130"/>
+            </a:xfrm>
+            <a:prstGeom prst="can">
+              <a:avLst>
+                <a:gd name="adj" fmla="val 43221"/>
+              </a:avLst>
+            </a:prstGeom>
+            <a:solidFill>
+              <a:srgbClr val="7030A0"/>
+            </a:solidFill>
+            <a:ln w="38100">
+              <a:solidFill>
+                <a:srgbClr val="002060"/>
+              </a:solidFill>
+            </a:ln>
+          </p:spPr>
+          <p:style>
+            <a:lnRef idx="2">
+              <a:schemeClr val="accent1">
+                <a:shade val="50000"/>
+              </a:schemeClr>
+            </a:lnRef>
+            <a:fillRef idx="1">
+              <a:schemeClr val="accent1"/>
+            </a:fillRef>
+            <a:effectRef idx="0">
+              <a:schemeClr val="accent1"/>
+            </a:effectRef>
+            <a:fontRef idx="minor">
+              <a:schemeClr val="lt1"/>
+            </a:fontRef>
+          </p:style>
+          <p:txBody>
+            <a:bodyPr rtlCol="0" anchor="ctr"/>
+            <a:lstStyle/>
+            <a:p>
+              <a:pPr algn="ctr"/>
+              <a:endParaRPr lang="de-CH"/>
+            </a:p>
+          </p:txBody>
+        </p:sp>
+        <p:sp>
+          <p:nvSpPr>
+            <p:cNvPr id="7" name="Zylinder 6">
+              <a:extLst>
+                <a:ext uri="{FF2B5EF4-FFF2-40B4-BE49-F238E27FC236}">
+                  <a16:creationId xmlns:a16="http://schemas.microsoft.com/office/drawing/2014/main" id="{790B5FED-91EA-4A98-B118-3819583A0088}"/>
+                </a:ext>
+              </a:extLst>
+            </p:cNvPr>
+            <p:cNvSpPr/>
+            <p:nvPr/>
+          </p:nvSpPr>
+          <p:spPr>
+            <a:xfrm>
+              <a:off x="5059680" y="1406049"/>
+              <a:ext cx="963930" cy="405130"/>
+            </a:xfrm>
+            <a:prstGeom prst="can">
+              <a:avLst>
+                <a:gd name="adj" fmla="val 43221"/>
+              </a:avLst>
+            </a:prstGeom>
+            <a:solidFill>
+              <a:srgbClr val="7030A0"/>
+            </a:solidFill>
+            <a:ln w="38100">
+              <a:solidFill>
+                <a:srgbClr val="002060"/>
+              </a:solidFill>
+            </a:ln>
+          </p:spPr>
+          <p:style>
+            <a:lnRef idx="2">
+              <a:schemeClr val="accent1">
+                <a:shade val="50000"/>
+              </a:schemeClr>
+            </a:lnRef>
+            <a:fillRef idx="1">
+              <a:schemeClr val="accent1"/>
+            </a:fillRef>
+            <a:effectRef idx="0">
+              <a:schemeClr val="accent1"/>
+            </a:effectRef>
+            <a:fontRef idx="minor">
+              <a:schemeClr val="lt1"/>
+            </a:fontRef>
+          </p:style>
+          <p:txBody>
+            <a:bodyPr rtlCol="0" anchor="ctr"/>
+            <a:lstStyle/>
+            <a:p>
+              <a:pPr algn="ctr"/>
+              <a:endParaRPr lang="de-CH"/>
+            </a:p>
+          </p:txBody>
+        </p:sp>
+        <p:sp>
+          <p:nvSpPr>
+            <p:cNvPr id="8" name="Zylinder 7">
+              <a:extLst>
+                <a:ext uri="{FF2B5EF4-FFF2-40B4-BE49-F238E27FC236}">
+                  <a16:creationId xmlns:a16="http://schemas.microsoft.com/office/drawing/2014/main" id="{F5747061-283B-459D-A9FF-1E71CD757327}"/>
+                </a:ext>
+              </a:extLst>
+            </p:cNvPr>
+            <p:cNvSpPr/>
+            <p:nvPr/>
+          </p:nvSpPr>
+          <p:spPr>
+            <a:xfrm>
+              <a:off x="5059680" y="1175068"/>
+              <a:ext cx="963930" cy="405130"/>
+            </a:xfrm>
+            <a:prstGeom prst="can">
+              <a:avLst>
+                <a:gd name="adj" fmla="val 43221"/>
+              </a:avLst>
+            </a:prstGeom>
+            <a:solidFill>
+              <a:srgbClr val="7030A0"/>
+            </a:solidFill>
+            <a:ln w="38100">
+              <a:solidFill>
+                <a:srgbClr val="002060"/>
+              </a:solidFill>
+            </a:ln>
+          </p:spPr>
+          <p:style>
+            <a:lnRef idx="2">
+              <a:schemeClr val="accent1">
+                <a:shade val="50000"/>
+              </a:schemeClr>
+            </a:lnRef>
+            <a:fillRef idx="1">
+              <a:schemeClr val="accent1"/>
+            </a:fillRef>
+            <a:effectRef idx="0">
+              <a:schemeClr val="accent1"/>
+            </a:effectRef>
+            <a:fontRef idx="minor">
+              <a:schemeClr val="lt1"/>
+            </a:fontRef>
+          </p:style>
+          <p:txBody>
+            <a:bodyPr rtlCol="0" anchor="ctr"/>
+            <a:lstStyle/>
+            <a:p>
+              <a:pPr algn="ctr"/>
+              <a:endParaRPr lang="de-CH"/>
+            </a:p>
+          </p:txBody>
+        </p:sp>
+        <p:sp>
+          <p:nvSpPr>
+            <p:cNvPr id="9" name="Zylinder 8">
+              <a:extLst>
+                <a:ext uri="{FF2B5EF4-FFF2-40B4-BE49-F238E27FC236}">
+                  <a16:creationId xmlns:a16="http://schemas.microsoft.com/office/drawing/2014/main" id="{E2520082-1438-45AE-BEE7-C857536818F9}"/>
+                </a:ext>
+              </a:extLst>
+            </p:cNvPr>
+            <p:cNvSpPr/>
+            <p:nvPr/>
+          </p:nvSpPr>
+          <p:spPr>
+            <a:xfrm>
+              <a:off x="5059680" y="944087"/>
+              <a:ext cx="963930" cy="405130"/>
+            </a:xfrm>
+            <a:prstGeom prst="can">
+              <a:avLst>
+                <a:gd name="adj" fmla="val 43221"/>
+              </a:avLst>
+            </a:prstGeom>
+            <a:solidFill>
+              <a:srgbClr val="7030A0"/>
+            </a:solidFill>
+            <a:ln w="38100">
+              <a:solidFill>
+                <a:srgbClr val="002060"/>
+              </a:solidFill>
+            </a:ln>
+          </p:spPr>
+          <p:style>
+            <a:lnRef idx="2">
+              <a:schemeClr val="accent1">
+                <a:shade val="50000"/>
+              </a:schemeClr>
+            </a:lnRef>
+            <a:fillRef idx="1">
+              <a:schemeClr val="accent1"/>
+            </a:fillRef>
+            <a:effectRef idx="0">
+              <a:schemeClr val="accent1"/>
+            </a:effectRef>
+            <a:fontRef idx="minor">
+              <a:schemeClr val="lt1"/>
+            </a:fontRef>
+          </p:style>
+          <p:txBody>
+            <a:bodyPr rtlCol="0" anchor="ctr"/>
+            <a:lstStyle/>
+            <a:p>
+              <a:pPr algn="ctr"/>
+              <a:endParaRPr lang="de-CH"/>
+            </a:p>
+          </p:txBody>
+        </p:sp>
+      </p:grpSp>
+      <p:grpSp>
+        <p:nvGrpSpPr>
+          <p:cNvPr id="23" name="Gruppieren 22">
+            <a:extLst>
+              <a:ext uri="{FF2B5EF4-FFF2-40B4-BE49-F238E27FC236}">
+                <a16:creationId xmlns:a16="http://schemas.microsoft.com/office/drawing/2014/main" id="{ACAE6233-1A6A-4423-8909-F54249F4994B}"/>
+              </a:ext>
+            </a:extLst>
+          </p:cNvPr>
+          <p:cNvGrpSpPr/>
+          <p:nvPr/>
+        </p:nvGrpSpPr>
+        <p:grpSpPr>
+          <a:xfrm>
+            <a:off x="3068955" y="1406049"/>
+            <a:ext cx="963930" cy="1098073"/>
+            <a:chOff x="3068955" y="1406049"/>
+            <a:chExt cx="963930" cy="1098073"/>
+          </a:xfrm>
+        </p:grpSpPr>
+        <p:sp>
+          <p:nvSpPr>
+            <p:cNvPr id="10" name="Zylinder 9">
+              <a:extLst>
+                <a:ext uri="{FF2B5EF4-FFF2-40B4-BE49-F238E27FC236}">
+                  <a16:creationId xmlns:a16="http://schemas.microsoft.com/office/drawing/2014/main" id="{A3D5ED3C-DE74-4E61-B9E1-4EE221DC1DA5}"/>
+                </a:ext>
+              </a:extLst>
+            </p:cNvPr>
+            <p:cNvSpPr/>
+            <p:nvPr/>
+          </p:nvSpPr>
+          <p:spPr>
+            <a:xfrm>
+              <a:off x="3068955" y="2098992"/>
+              <a:ext cx="963930" cy="405130"/>
+            </a:xfrm>
+            <a:prstGeom prst="can">
+              <a:avLst>
+                <a:gd name="adj" fmla="val 43221"/>
+              </a:avLst>
+            </a:prstGeom>
+            <a:solidFill>
+              <a:schemeClr val="accent1">
+                <a:lumMod val="75000"/>
+              </a:schemeClr>
+            </a:solidFill>
+            <a:ln w="38100">
+              <a:solidFill>
+                <a:schemeClr val="accent1">
+                  <a:lumMod val="50000"/>
+                </a:schemeClr>
+              </a:solidFill>
+            </a:ln>
+          </p:spPr>
+          <p:style>
+            <a:lnRef idx="2">
+              <a:schemeClr val="accent1">
+                <a:shade val="50000"/>
+              </a:schemeClr>
+            </a:lnRef>
+            <a:fillRef idx="1">
+              <a:schemeClr val="accent1"/>
+            </a:fillRef>
+            <a:effectRef idx="0">
+              <a:schemeClr val="accent1"/>
+            </a:effectRef>
+            <a:fontRef idx="minor">
+              <a:schemeClr val="lt1"/>
+            </a:fontRef>
+          </p:style>
+          <p:txBody>
+            <a:bodyPr rtlCol="0" anchor="ctr"/>
+            <a:lstStyle/>
+            <a:p>
+              <a:pPr algn="ctr"/>
+              <a:endParaRPr lang="de-CH"/>
+            </a:p>
+          </p:txBody>
+        </p:sp>
+        <p:sp>
+          <p:nvSpPr>
+            <p:cNvPr id="11" name="Zylinder 10">
+              <a:extLst>
+                <a:ext uri="{FF2B5EF4-FFF2-40B4-BE49-F238E27FC236}">
+                  <a16:creationId xmlns:a16="http://schemas.microsoft.com/office/drawing/2014/main" id="{16B61AC3-A504-4CD8-BB1E-AF9602D1D870}"/>
+                </a:ext>
+              </a:extLst>
+            </p:cNvPr>
+            <p:cNvSpPr/>
+            <p:nvPr/>
+          </p:nvSpPr>
+          <p:spPr>
+            <a:xfrm>
+              <a:off x="3068955" y="1868011"/>
+              <a:ext cx="963930" cy="405130"/>
+            </a:xfrm>
+            <a:prstGeom prst="can">
+              <a:avLst>
+                <a:gd name="adj" fmla="val 43221"/>
+              </a:avLst>
+            </a:prstGeom>
+            <a:solidFill>
+              <a:schemeClr val="accent1">
+                <a:lumMod val="75000"/>
+              </a:schemeClr>
+            </a:solidFill>
+            <a:ln w="38100">
+              <a:solidFill>
+                <a:schemeClr val="accent1">
+                  <a:lumMod val="50000"/>
+                </a:schemeClr>
+              </a:solidFill>
+            </a:ln>
+          </p:spPr>
+          <p:style>
+            <a:lnRef idx="2">
+              <a:schemeClr val="accent1">
+                <a:shade val="50000"/>
+              </a:schemeClr>
+            </a:lnRef>
+            <a:fillRef idx="1">
+              <a:schemeClr val="accent1"/>
+            </a:fillRef>
+            <a:effectRef idx="0">
+              <a:schemeClr val="accent1"/>
+            </a:effectRef>
+            <a:fontRef idx="minor">
+              <a:schemeClr val="lt1"/>
+            </a:fontRef>
+          </p:style>
+          <p:txBody>
+            <a:bodyPr rtlCol="0" anchor="ctr"/>
+            <a:lstStyle/>
+            <a:p>
+              <a:pPr algn="ctr"/>
+              <a:endParaRPr lang="de-CH"/>
+            </a:p>
+          </p:txBody>
+        </p:sp>
+        <p:sp>
+          <p:nvSpPr>
+            <p:cNvPr id="12" name="Zylinder 11">
+              <a:extLst>
+                <a:ext uri="{FF2B5EF4-FFF2-40B4-BE49-F238E27FC236}">
+                  <a16:creationId xmlns:a16="http://schemas.microsoft.com/office/drawing/2014/main" id="{02335C5A-414E-4296-A490-FAAC4CBEDC6A}"/>
+                </a:ext>
+              </a:extLst>
+            </p:cNvPr>
+            <p:cNvSpPr/>
+            <p:nvPr/>
+          </p:nvSpPr>
+          <p:spPr>
+            <a:xfrm>
+              <a:off x="3068955" y="1637030"/>
+              <a:ext cx="963930" cy="405130"/>
+            </a:xfrm>
+            <a:prstGeom prst="can">
+              <a:avLst>
+                <a:gd name="adj" fmla="val 43221"/>
+              </a:avLst>
+            </a:prstGeom>
+            <a:solidFill>
+              <a:schemeClr val="accent1">
+                <a:lumMod val="75000"/>
+              </a:schemeClr>
+            </a:solidFill>
+            <a:ln w="38100">
+              <a:solidFill>
+                <a:schemeClr val="accent1">
+                  <a:lumMod val="50000"/>
+                </a:schemeClr>
+              </a:solidFill>
+            </a:ln>
+          </p:spPr>
+          <p:style>
+            <a:lnRef idx="2">
+              <a:schemeClr val="accent1">
+                <a:shade val="50000"/>
+              </a:schemeClr>
+            </a:lnRef>
+            <a:fillRef idx="1">
+              <a:schemeClr val="accent1"/>
+            </a:fillRef>
+            <a:effectRef idx="0">
+              <a:schemeClr val="accent1"/>
+            </a:effectRef>
+            <a:fontRef idx="minor">
+              <a:schemeClr val="lt1"/>
+            </a:fontRef>
+          </p:style>
+          <p:txBody>
+            <a:bodyPr rtlCol="0" anchor="ctr"/>
+            <a:lstStyle/>
+            <a:p>
+              <a:pPr algn="ctr"/>
+              <a:endParaRPr lang="de-CH"/>
+            </a:p>
+          </p:txBody>
+        </p:sp>
+        <p:sp>
+          <p:nvSpPr>
+            <p:cNvPr id="13" name="Zylinder 12">
+              <a:extLst>
+                <a:ext uri="{FF2B5EF4-FFF2-40B4-BE49-F238E27FC236}">
+                  <a16:creationId xmlns:a16="http://schemas.microsoft.com/office/drawing/2014/main" id="{07FFBC33-A5DF-41A7-91F8-B5B99EE4402A}"/>
+                </a:ext>
+              </a:extLst>
+            </p:cNvPr>
+            <p:cNvSpPr/>
+            <p:nvPr/>
+          </p:nvSpPr>
+          <p:spPr>
+            <a:xfrm>
+              <a:off x="3068955" y="1406049"/>
+              <a:ext cx="963930" cy="405130"/>
+            </a:xfrm>
+            <a:prstGeom prst="can">
+              <a:avLst>
+                <a:gd name="adj" fmla="val 43221"/>
+              </a:avLst>
+            </a:prstGeom>
+            <a:solidFill>
+              <a:schemeClr val="accent1">
+                <a:lumMod val="75000"/>
+              </a:schemeClr>
+            </a:solidFill>
+            <a:ln w="38100">
+              <a:solidFill>
+                <a:schemeClr val="accent1">
+                  <a:lumMod val="50000"/>
+                </a:schemeClr>
+              </a:solidFill>
+            </a:ln>
+          </p:spPr>
+          <p:style>
+            <a:lnRef idx="2">
+              <a:schemeClr val="accent1">
+                <a:shade val="50000"/>
+              </a:schemeClr>
+            </a:lnRef>
+            <a:fillRef idx="1">
+              <a:schemeClr val="accent1"/>
+            </a:fillRef>
+            <a:effectRef idx="0">
+              <a:schemeClr val="accent1"/>
+            </a:effectRef>
+            <a:fontRef idx="minor">
+              <a:schemeClr val="lt1"/>
+            </a:fontRef>
+          </p:style>
+          <p:txBody>
+            <a:bodyPr rtlCol="0" anchor="ctr"/>
+            <a:lstStyle/>
+            <a:p>
+              <a:pPr algn="ctr"/>
+              <a:endParaRPr lang="de-CH"/>
+            </a:p>
+          </p:txBody>
+        </p:sp>
+      </p:grpSp>
+      <p:grpSp>
+        <p:nvGrpSpPr>
+          <p:cNvPr id="22" name="Gruppieren 21">
+            <a:extLst>
+              <a:ext uri="{FF2B5EF4-FFF2-40B4-BE49-F238E27FC236}">
+                <a16:creationId xmlns:a16="http://schemas.microsoft.com/office/drawing/2014/main" id="{058EDA28-7AC5-4888-9CF8-FA3CD7321068}"/>
+              </a:ext>
+            </a:extLst>
+          </p:cNvPr>
+          <p:cNvGrpSpPr/>
+          <p:nvPr/>
+        </p:nvGrpSpPr>
+        <p:grpSpPr>
+          <a:xfrm>
+            <a:off x="7050405" y="1406049"/>
+            <a:ext cx="963930" cy="1098073"/>
+            <a:chOff x="7050405" y="1406049"/>
+            <a:chExt cx="963930" cy="1098073"/>
+          </a:xfrm>
+        </p:grpSpPr>
+        <p:sp>
+          <p:nvSpPr>
+            <p:cNvPr id="14" name="Zylinder 13">
+              <a:extLst>
+                <a:ext uri="{FF2B5EF4-FFF2-40B4-BE49-F238E27FC236}">
+                  <a16:creationId xmlns:a16="http://schemas.microsoft.com/office/drawing/2014/main" id="{C99C46CD-CC46-4D3E-8047-66D5A2C4CBC3}"/>
+                </a:ext>
+              </a:extLst>
+            </p:cNvPr>
+            <p:cNvSpPr/>
+            <p:nvPr/>
+          </p:nvSpPr>
+          <p:spPr>
+            <a:xfrm>
+              <a:off x="7050405" y="2098992"/>
+              <a:ext cx="963930" cy="405130"/>
+            </a:xfrm>
+            <a:prstGeom prst="can">
+              <a:avLst>
+                <a:gd name="adj" fmla="val 43221"/>
+              </a:avLst>
+            </a:prstGeom>
+            <a:solidFill>
+              <a:schemeClr val="accent6">
+                <a:lumMod val="60000"/>
+                <a:lumOff val="40000"/>
+              </a:schemeClr>
+            </a:solidFill>
+            <a:ln w="38100">
+              <a:solidFill>
+                <a:schemeClr val="accent6">
+                  <a:lumMod val="50000"/>
+                </a:schemeClr>
+              </a:solidFill>
+            </a:ln>
+          </p:spPr>
+          <p:style>
+            <a:lnRef idx="2">
+              <a:schemeClr val="accent1">
+                <a:shade val="50000"/>
+              </a:schemeClr>
+            </a:lnRef>
+            <a:fillRef idx="1">
+              <a:schemeClr val="accent1"/>
+            </a:fillRef>
+            <a:effectRef idx="0">
+              <a:schemeClr val="accent1"/>
+            </a:effectRef>
+            <a:fontRef idx="minor">
+              <a:schemeClr val="lt1"/>
+            </a:fontRef>
+          </p:style>
+          <p:txBody>
+            <a:bodyPr rtlCol="0" anchor="ctr"/>
+            <a:lstStyle/>
+            <a:p>
+              <a:pPr algn="ctr"/>
+              <a:endParaRPr lang="de-CH"/>
+            </a:p>
+          </p:txBody>
+        </p:sp>
+        <p:sp>
+          <p:nvSpPr>
+            <p:cNvPr id="15" name="Zylinder 14">
+              <a:extLst>
+                <a:ext uri="{FF2B5EF4-FFF2-40B4-BE49-F238E27FC236}">
+                  <a16:creationId xmlns:a16="http://schemas.microsoft.com/office/drawing/2014/main" id="{6C1D44D2-B8F1-41AD-989A-6D6D0AD3B8B8}"/>
+                </a:ext>
+              </a:extLst>
+            </p:cNvPr>
+            <p:cNvSpPr/>
+            <p:nvPr/>
+          </p:nvSpPr>
+          <p:spPr>
+            <a:xfrm>
+              <a:off x="7050405" y="1868011"/>
+              <a:ext cx="963930" cy="405130"/>
+            </a:xfrm>
+            <a:prstGeom prst="can">
+              <a:avLst>
+                <a:gd name="adj" fmla="val 43221"/>
+              </a:avLst>
+            </a:prstGeom>
+            <a:solidFill>
+              <a:schemeClr val="accent6">
+                <a:lumMod val="60000"/>
+                <a:lumOff val="40000"/>
+              </a:schemeClr>
+            </a:solidFill>
+            <a:ln w="38100">
+              <a:solidFill>
+                <a:schemeClr val="accent6">
+                  <a:lumMod val="50000"/>
+                </a:schemeClr>
+              </a:solidFill>
+            </a:ln>
+          </p:spPr>
+          <p:style>
+            <a:lnRef idx="2">
+              <a:schemeClr val="accent1">
+                <a:shade val="50000"/>
+              </a:schemeClr>
+            </a:lnRef>
+            <a:fillRef idx="1">
+              <a:schemeClr val="accent1"/>
+            </a:fillRef>
+            <a:effectRef idx="0">
+              <a:schemeClr val="accent1"/>
+            </a:effectRef>
+            <a:fontRef idx="minor">
+              <a:schemeClr val="lt1"/>
+            </a:fontRef>
+          </p:style>
+          <p:txBody>
+            <a:bodyPr rtlCol="0" anchor="ctr"/>
+            <a:lstStyle/>
+            <a:p>
+              <a:pPr algn="ctr"/>
+              <a:endParaRPr lang="de-CH"/>
+            </a:p>
+          </p:txBody>
+        </p:sp>
+        <p:sp>
+          <p:nvSpPr>
+            <p:cNvPr id="16" name="Zylinder 15">
+              <a:extLst>
+                <a:ext uri="{FF2B5EF4-FFF2-40B4-BE49-F238E27FC236}">
+                  <a16:creationId xmlns:a16="http://schemas.microsoft.com/office/drawing/2014/main" id="{97668139-C1D7-4805-8C09-6DF12AF9375C}"/>
+                </a:ext>
+              </a:extLst>
+            </p:cNvPr>
+            <p:cNvSpPr/>
+            <p:nvPr/>
+          </p:nvSpPr>
+          <p:spPr>
+            <a:xfrm>
+              <a:off x="7050405" y="1637030"/>
+              <a:ext cx="963930" cy="405130"/>
+            </a:xfrm>
+            <a:prstGeom prst="can">
+              <a:avLst>
+                <a:gd name="adj" fmla="val 43221"/>
+              </a:avLst>
+            </a:prstGeom>
+            <a:solidFill>
+              <a:schemeClr val="accent6">
+                <a:lumMod val="60000"/>
+                <a:lumOff val="40000"/>
+              </a:schemeClr>
+            </a:solidFill>
+            <a:ln w="38100">
+              <a:solidFill>
+                <a:schemeClr val="accent6">
+                  <a:lumMod val="50000"/>
+                </a:schemeClr>
+              </a:solidFill>
+            </a:ln>
+          </p:spPr>
+          <p:style>
+            <a:lnRef idx="2">
+              <a:schemeClr val="accent1">
+                <a:shade val="50000"/>
+              </a:schemeClr>
+            </a:lnRef>
+            <a:fillRef idx="1">
+              <a:schemeClr val="accent1"/>
+            </a:fillRef>
+            <a:effectRef idx="0">
+              <a:schemeClr val="accent1"/>
+            </a:effectRef>
+            <a:fontRef idx="minor">
+              <a:schemeClr val="lt1"/>
+            </a:fontRef>
+          </p:style>
+          <p:txBody>
+            <a:bodyPr rtlCol="0" anchor="ctr"/>
+            <a:lstStyle/>
+            <a:p>
+              <a:pPr algn="ctr"/>
+              <a:endParaRPr lang="de-CH"/>
+            </a:p>
+          </p:txBody>
+        </p:sp>
+        <p:sp>
+          <p:nvSpPr>
+            <p:cNvPr id="17" name="Zylinder 16">
+              <a:extLst>
+                <a:ext uri="{FF2B5EF4-FFF2-40B4-BE49-F238E27FC236}">
+                  <a16:creationId xmlns:a16="http://schemas.microsoft.com/office/drawing/2014/main" id="{1B3D0DD9-ECE8-405F-B66B-95B08BBA9A7F}"/>
+                </a:ext>
+              </a:extLst>
+            </p:cNvPr>
+            <p:cNvSpPr/>
+            <p:nvPr/>
+          </p:nvSpPr>
+          <p:spPr>
+            <a:xfrm>
+              <a:off x="7050405" y="1406049"/>
+              <a:ext cx="963930" cy="405130"/>
+            </a:xfrm>
+            <a:prstGeom prst="can">
+              <a:avLst>
+                <a:gd name="adj" fmla="val 43221"/>
+              </a:avLst>
+            </a:prstGeom>
+            <a:solidFill>
+              <a:schemeClr val="accent6">
+                <a:lumMod val="60000"/>
+                <a:lumOff val="40000"/>
+              </a:schemeClr>
+            </a:solidFill>
+            <a:ln w="38100">
+              <a:solidFill>
+                <a:schemeClr val="accent6">
+                  <a:lumMod val="50000"/>
+                </a:schemeClr>
+              </a:solidFill>
+            </a:ln>
+          </p:spPr>
+          <p:style>
+            <a:lnRef idx="2">
+              <a:schemeClr val="accent1">
+                <a:shade val="50000"/>
+              </a:schemeClr>
+            </a:lnRef>
+            <a:fillRef idx="1">
+              <a:schemeClr val="accent1"/>
+            </a:fillRef>
+            <a:effectRef idx="0">
+              <a:schemeClr val="accent1"/>
+            </a:effectRef>
+            <a:fontRef idx="minor">
+              <a:schemeClr val="lt1"/>
+            </a:fontRef>
+          </p:style>
+          <p:txBody>
+            <a:bodyPr rtlCol="0" anchor="ctr"/>
+            <a:lstStyle/>
+            <a:p>
+              <a:pPr algn="ctr"/>
+              <a:endParaRPr lang="de-CH"/>
+            </a:p>
+          </p:txBody>
+        </p:sp>
+      </p:grpSp>
+      <p:grpSp>
+        <p:nvGrpSpPr>
+          <p:cNvPr id="20" name="Gruppieren 19">
+            <a:extLst>
+              <a:ext uri="{FF2B5EF4-FFF2-40B4-BE49-F238E27FC236}">
+                <a16:creationId xmlns:a16="http://schemas.microsoft.com/office/drawing/2014/main" id="{137AA0C8-2FF3-4F9B-A18F-FB9E65325D36}"/>
+              </a:ext>
+            </a:extLst>
+          </p:cNvPr>
+          <p:cNvGrpSpPr/>
+          <p:nvPr/>
+        </p:nvGrpSpPr>
+        <p:grpSpPr>
+          <a:xfrm>
+            <a:off x="5254944" y="2909116"/>
+            <a:ext cx="573401" cy="727712"/>
+            <a:chOff x="4973955" y="2941318"/>
+            <a:chExt cx="622935" cy="790576"/>
+          </a:xfrm>
+        </p:grpSpPr>
+        <p:sp>
+          <p:nvSpPr>
+            <p:cNvPr id="18" name="Flussdiagramm: Verzögerung 17">
+              <a:extLst>
+                <a:ext uri="{FF2B5EF4-FFF2-40B4-BE49-F238E27FC236}">
+                  <a16:creationId xmlns:a16="http://schemas.microsoft.com/office/drawing/2014/main" id="{664D4850-8E42-4E5A-9EF8-B5D53C2F2E01}"/>
+                </a:ext>
+              </a:extLst>
+            </p:cNvPr>
+            <p:cNvSpPr/>
+            <p:nvPr/>
+          </p:nvSpPr>
+          <p:spPr>
+            <a:xfrm rot="16200000">
+              <a:off x="5080635" y="3215639"/>
+              <a:ext cx="409575" cy="622935"/>
+            </a:xfrm>
+            <a:prstGeom prst="flowChartDelay">
+              <a:avLst/>
+            </a:prstGeom>
+            <a:solidFill>
+              <a:srgbClr val="7030A0"/>
+            </a:solidFill>
+            <a:ln w="38100">
+              <a:solidFill>
+                <a:srgbClr val="002060"/>
+              </a:solidFill>
+            </a:ln>
+          </p:spPr>
+          <p:style>
+            <a:lnRef idx="2">
+              <a:schemeClr val="accent1">
+                <a:shade val="50000"/>
+              </a:schemeClr>
+            </a:lnRef>
+            <a:fillRef idx="1">
+              <a:schemeClr val="accent1"/>
+            </a:fillRef>
+            <a:effectRef idx="0">
+              <a:schemeClr val="accent1"/>
+            </a:effectRef>
+            <a:fontRef idx="minor">
+              <a:schemeClr val="lt1"/>
+            </a:fontRef>
+          </p:style>
+          <p:txBody>
+            <a:bodyPr rot="0" spcFirstLastPara="0" vertOverflow="overflow" horzOverflow="overflow" vert="horz" wrap="square" lIns="91440" tIns="45720" rIns="91440" bIns="45720" numCol="1" spcCol="0" rtlCol="0" fromWordArt="0" anchor="ctr" anchorCtr="0" forceAA="0" compatLnSpc="1">
+              <a:prstTxWarp prst="textNoShape">
+                <a:avLst/>
+              </a:prstTxWarp>
+              <a:noAutofit/>
+            </a:bodyPr>
+            <a:lstStyle/>
+            <a:p>
+              <a:pPr algn="ctr"/>
+              <a:endParaRPr lang="de-CH"/>
+            </a:p>
+          </p:txBody>
+        </p:sp>
+        <p:sp>
+          <p:nvSpPr>
+            <p:cNvPr id="19" name="Ellipse 18">
+              <a:extLst>
+                <a:ext uri="{FF2B5EF4-FFF2-40B4-BE49-F238E27FC236}">
+                  <a16:creationId xmlns:a16="http://schemas.microsoft.com/office/drawing/2014/main" id="{AA56748D-D228-4D17-A7D5-6D24F7A1694C}"/>
+                </a:ext>
+              </a:extLst>
+            </p:cNvPr>
+            <p:cNvSpPr/>
+            <p:nvPr/>
+          </p:nvSpPr>
+          <p:spPr>
+            <a:xfrm>
+              <a:off x="5094922" y="2941318"/>
+              <a:ext cx="381000" cy="381000"/>
+            </a:xfrm>
+            <a:prstGeom prst="ellipse">
+              <a:avLst/>
+            </a:prstGeom>
+            <a:solidFill>
+              <a:srgbClr val="7030A0"/>
+            </a:solidFill>
+            <a:ln w="38100">
+              <a:solidFill>
+                <a:srgbClr val="002060"/>
+              </a:solidFill>
+            </a:ln>
+          </p:spPr>
+          <p:style>
+            <a:lnRef idx="2">
+              <a:schemeClr val="accent1">
+                <a:shade val="50000"/>
+              </a:schemeClr>
+            </a:lnRef>
+            <a:fillRef idx="1">
+              <a:schemeClr val="accent1"/>
+            </a:fillRef>
+            <a:effectRef idx="0">
+              <a:schemeClr val="accent1"/>
+            </a:effectRef>
+            <a:fontRef idx="minor">
+              <a:schemeClr val="lt1"/>
+            </a:fontRef>
+          </p:style>
+          <p:txBody>
+            <a:bodyPr rot="0" spcFirstLastPara="0" vertOverflow="overflow" horzOverflow="overflow" vert="horz" wrap="square" lIns="91440" tIns="45720" rIns="91440" bIns="45720" numCol="1" spcCol="0" rtlCol="0" fromWordArt="0" anchor="ctr" anchorCtr="0" forceAA="0" compatLnSpc="1">
+              <a:prstTxWarp prst="textNoShape">
+                <a:avLst/>
+              </a:prstTxWarp>
+              <a:noAutofit/>
+            </a:bodyPr>
+            <a:lstStyle/>
+            <a:p>
+              <a:pPr algn="ctr"/>
+              <a:endParaRPr lang="de-CH"/>
+            </a:p>
+          </p:txBody>
+        </p:sp>
+      </p:grpSp>
+      <p:grpSp>
+        <p:nvGrpSpPr>
+          <p:cNvPr id="24" name="Gruppieren 23">
+            <a:extLst>
+              <a:ext uri="{FF2B5EF4-FFF2-40B4-BE49-F238E27FC236}">
+                <a16:creationId xmlns:a16="http://schemas.microsoft.com/office/drawing/2014/main" id="{420350C4-5D16-4A5A-BF9E-134154EB3273}"/>
+              </a:ext>
+            </a:extLst>
+          </p:cNvPr>
+          <p:cNvGrpSpPr/>
+          <p:nvPr/>
+        </p:nvGrpSpPr>
+        <p:grpSpPr>
+          <a:xfrm>
+            <a:off x="3264219" y="2909116"/>
+            <a:ext cx="573401" cy="727712"/>
+            <a:chOff x="4973955" y="2941318"/>
+            <a:chExt cx="622935" cy="790576"/>
+          </a:xfrm>
+        </p:grpSpPr>
+        <p:sp>
+          <p:nvSpPr>
+            <p:cNvPr id="25" name="Flussdiagramm: Verzögerung 24">
+              <a:extLst>
+                <a:ext uri="{FF2B5EF4-FFF2-40B4-BE49-F238E27FC236}">
+                  <a16:creationId xmlns:a16="http://schemas.microsoft.com/office/drawing/2014/main" id="{B105E9ED-E389-4616-8EC1-A7AC64CB567C}"/>
+                </a:ext>
+              </a:extLst>
+            </p:cNvPr>
+            <p:cNvSpPr/>
+            <p:nvPr/>
+          </p:nvSpPr>
+          <p:spPr>
+            <a:xfrm rot="16200000">
+              <a:off x="5080635" y="3215639"/>
+              <a:ext cx="409575" cy="622935"/>
+            </a:xfrm>
+            <a:prstGeom prst="flowChartDelay">
+              <a:avLst/>
+            </a:prstGeom>
+            <a:solidFill>
+              <a:schemeClr val="accent1">
+                <a:lumMod val="75000"/>
+              </a:schemeClr>
+            </a:solidFill>
+            <a:ln w="38100">
+              <a:solidFill>
+                <a:schemeClr val="accent1">
+                  <a:lumMod val="50000"/>
+                </a:schemeClr>
+              </a:solidFill>
+            </a:ln>
+          </p:spPr>
+          <p:style>
+            <a:lnRef idx="2">
+              <a:schemeClr val="accent1">
+                <a:shade val="50000"/>
+              </a:schemeClr>
+            </a:lnRef>
+            <a:fillRef idx="1">
+              <a:schemeClr val="accent1"/>
+            </a:fillRef>
+            <a:effectRef idx="0">
+              <a:schemeClr val="accent1"/>
+            </a:effectRef>
+            <a:fontRef idx="minor">
+              <a:schemeClr val="lt1"/>
+            </a:fontRef>
+          </p:style>
+          <p:txBody>
+            <a:bodyPr rot="0" spcFirstLastPara="0" vertOverflow="overflow" horzOverflow="overflow" vert="horz" wrap="square" lIns="91440" tIns="45720" rIns="91440" bIns="45720" numCol="1" spcCol="0" rtlCol="0" fromWordArt="0" anchor="ctr" anchorCtr="0" forceAA="0" compatLnSpc="1">
+              <a:prstTxWarp prst="textNoShape">
+                <a:avLst/>
+              </a:prstTxWarp>
+              <a:noAutofit/>
+            </a:bodyPr>
+            <a:lstStyle/>
+            <a:p>
+              <a:pPr algn="ctr"/>
+              <a:endParaRPr lang="de-CH"/>
+            </a:p>
+          </p:txBody>
+        </p:sp>
+        <p:sp>
+          <p:nvSpPr>
+            <p:cNvPr id="26" name="Ellipse 25">
+              <a:extLst>
+                <a:ext uri="{FF2B5EF4-FFF2-40B4-BE49-F238E27FC236}">
+                  <a16:creationId xmlns:a16="http://schemas.microsoft.com/office/drawing/2014/main" id="{881CFD8A-4CEE-474D-B70A-C65BF86DEA31}"/>
+                </a:ext>
+              </a:extLst>
+            </p:cNvPr>
+            <p:cNvSpPr/>
+            <p:nvPr/>
+          </p:nvSpPr>
+          <p:spPr>
+            <a:xfrm>
+              <a:off x="5094922" y="2941318"/>
+              <a:ext cx="381000" cy="381000"/>
+            </a:xfrm>
+            <a:prstGeom prst="ellipse">
+              <a:avLst/>
+            </a:prstGeom>
+            <a:solidFill>
+              <a:schemeClr val="accent1">
+                <a:lumMod val="75000"/>
+              </a:schemeClr>
+            </a:solidFill>
+            <a:ln w="38100">
+              <a:solidFill>
+                <a:schemeClr val="accent1">
+                  <a:lumMod val="50000"/>
+                </a:schemeClr>
+              </a:solidFill>
+            </a:ln>
+          </p:spPr>
+          <p:style>
+            <a:lnRef idx="2">
+              <a:schemeClr val="accent1">
+                <a:shade val="50000"/>
+              </a:schemeClr>
+            </a:lnRef>
+            <a:fillRef idx="1">
+              <a:schemeClr val="accent1"/>
+            </a:fillRef>
+            <a:effectRef idx="0">
+              <a:schemeClr val="accent1"/>
+            </a:effectRef>
+            <a:fontRef idx="minor">
+              <a:schemeClr val="lt1"/>
+            </a:fontRef>
+          </p:style>
+          <p:txBody>
+            <a:bodyPr rot="0" spcFirstLastPara="0" vertOverflow="overflow" horzOverflow="overflow" vert="horz" wrap="square" lIns="91440" tIns="45720" rIns="91440" bIns="45720" numCol="1" spcCol="0" rtlCol="0" fromWordArt="0" anchor="ctr" anchorCtr="0" forceAA="0" compatLnSpc="1">
+              <a:prstTxWarp prst="textNoShape">
+                <a:avLst/>
+              </a:prstTxWarp>
+              <a:noAutofit/>
+            </a:bodyPr>
+            <a:lstStyle/>
+            <a:p>
+              <a:pPr algn="ctr"/>
+              <a:endParaRPr lang="de-CH"/>
+            </a:p>
+          </p:txBody>
+        </p:sp>
+      </p:grpSp>
+      <p:grpSp>
+        <p:nvGrpSpPr>
+          <p:cNvPr id="27" name="Gruppieren 26">
+            <a:extLst>
+              <a:ext uri="{FF2B5EF4-FFF2-40B4-BE49-F238E27FC236}">
+                <a16:creationId xmlns:a16="http://schemas.microsoft.com/office/drawing/2014/main" id="{A9D5A2B2-972A-468D-B8FF-5E469ABEF194}"/>
+              </a:ext>
+            </a:extLst>
+          </p:cNvPr>
+          <p:cNvGrpSpPr/>
+          <p:nvPr/>
+        </p:nvGrpSpPr>
+        <p:grpSpPr>
+          <a:xfrm>
+            <a:off x="7245669" y="2909116"/>
+            <a:ext cx="573401" cy="727712"/>
+            <a:chOff x="4973955" y="2941318"/>
+            <a:chExt cx="622935" cy="790576"/>
+          </a:xfrm>
+        </p:grpSpPr>
+        <p:sp>
+          <p:nvSpPr>
+            <p:cNvPr id="28" name="Flussdiagramm: Verzögerung 27">
+              <a:extLst>
+                <a:ext uri="{FF2B5EF4-FFF2-40B4-BE49-F238E27FC236}">
+                  <a16:creationId xmlns:a16="http://schemas.microsoft.com/office/drawing/2014/main" id="{9F223261-DF89-4AA6-ADEB-42A4589AF776}"/>
+                </a:ext>
+              </a:extLst>
+            </p:cNvPr>
+            <p:cNvSpPr/>
+            <p:nvPr/>
+          </p:nvSpPr>
+          <p:spPr>
+            <a:xfrm rot="16200000">
+              <a:off x="5080635" y="3215639"/>
+              <a:ext cx="409575" cy="622935"/>
+            </a:xfrm>
+            <a:prstGeom prst="flowChartDelay">
+              <a:avLst/>
+            </a:prstGeom>
+            <a:solidFill>
+              <a:schemeClr val="accent6">
+                <a:lumMod val="60000"/>
+                <a:lumOff val="40000"/>
+              </a:schemeClr>
+            </a:solidFill>
+            <a:ln w="38100">
+              <a:solidFill>
+                <a:schemeClr val="accent6">
+                  <a:lumMod val="50000"/>
+                </a:schemeClr>
+              </a:solidFill>
+            </a:ln>
+          </p:spPr>
+          <p:style>
+            <a:lnRef idx="2">
+              <a:schemeClr val="accent1">
+                <a:shade val="50000"/>
+              </a:schemeClr>
+            </a:lnRef>
+            <a:fillRef idx="1">
+              <a:schemeClr val="accent1"/>
+            </a:fillRef>
+            <a:effectRef idx="0">
+              <a:schemeClr val="accent1"/>
+            </a:effectRef>
+            <a:fontRef idx="minor">
+              <a:schemeClr val="lt1"/>
+            </a:fontRef>
+          </p:style>
+          <p:txBody>
+            <a:bodyPr rot="0" spcFirstLastPara="0" vertOverflow="overflow" horzOverflow="overflow" vert="horz" wrap="square" lIns="91440" tIns="45720" rIns="91440" bIns="45720" numCol="1" spcCol="0" rtlCol="0" fromWordArt="0" anchor="ctr" anchorCtr="0" forceAA="0" compatLnSpc="1">
+              <a:prstTxWarp prst="textNoShape">
+                <a:avLst/>
+              </a:prstTxWarp>
+              <a:noAutofit/>
+            </a:bodyPr>
+            <a:lstStyle/>
+            <a:p>
+              <a:pPr algn="ctr"/>
+              <a:endParaRPr lang="de-CH"/>
+            </a:p>
+          </p:txBody>
+        </p:sp>
+        <p:sp>
+          <p:nvSpPr>
+            <p:cNvPr id="29" name="Ellipse 28">
+              <a:extLst>
+                <a:ext uri="{FF2B5EF4-FFF2-40B4-BE49-F238E27FC236}">
+                  <a16:creationId xmlns:a16="http://schemas.microsoft.com/office/drawing/2014/main" id="{E91172A6-7F9E-4581-BCE8-99F927D0B9E1}"/>
+                </a:ext>
+              </a:extLst>
+            </p:cNvPr>
+            <p:cNvSpPr/>
+            <p:nvPr/>
+          </p:nvSpPr>
+          <p:spPr>
+            <a:xfrm>
+              <a:off x="5094922" y="2941318"/>
+              <a:ext cx="381000" cy="381000"/>
+            </a:xfrm>
+            <a:prstGeom prst="ellipse">
+              <a:avLst/>
+            </a:prstGeom>
+            <a:solidFill>
+              <a:schemeClr val="accent6">
+                <a:lumMod val="60000"/>
+                <a:lumOff val="40000"/>
+              </a:schemeClr>
+            </a:solidFill>
+            <a:ln w="38100">
+              <a:solidFill>
+                <a:schemeClr val="accent6">
+                  <a:lumMod val="50000"/>
+                </a:schemeClr>
+              </a:solidFill>
+            </a:ln>
+          </p:spPr>
+          <p:style>
+            <a:lnRef idx="2">
+              <a:schemeClr val="accent1">
+                <a:shade val="50000"/>
+              </a:schemeClr>
+            </a:lnRef>
+            <a:fillRef idx="1">
+              <a:schemeClr val="accent1"/>
+            </a:fillRef>
+            <a:effectRef idx="0">
+              <a:schemeClr val="accent1"/>
+            </a:effectRef>
+            <a:fontRef idx="minor">
+              <a:schemeClr val="lt1"/>
+            </a:fontRef>
+          </p:style>
+          <p:txBody>
+            <a:bodyPr rot="0" spcFirstLastPara="0" vertOverflow="overflow" horzOverflow="overflow" vert="horz" wrap="square" lIns="91440" tIns="45720" rIns="91440" bIns="45720" numCol="1" spcCol="0" rtlCol="0" fromWordArt="0" anchor="ctr" anchorCtr="0" forceAA="0" compatLnSpc="1">
+              <a:prstTxWarp prst="textNoShape">
+                <a:avLst/>
+              </a:prstTxWarp>
+              <a:noAutofit/>
+            </a:bodyPr>
+            <a:lstStyle/>
+            <a:p>
+              <a:pPr algn="ctr"/>
+              <a:endParaRPr lang="de-CH"/>
+            </a:p>
+          </p:txBody>
+        </p:sp>
+      </p:grpSp>
+    </p:spTree>
+    <p:extLst>
+      <p:ext uri="{BB962C8B-B14F-4D97-AF65-F5344CB8AC3E}">
+        <p14:creationId xmlns:p14="http://schemas.microsoft.com/office/powerpoint/2010/main" val="988161133"/>
       </p:ext>
     </p:extLst>
   </p:cSld>

</xml_diff>